<commit_message>
Updated exercises in inheritance advanced slides
</commit_message>
<xml_diff>
--- a/Courses/Software-Sciences/Module-1-OOP/09.2-Inheritance-Advanced/09.2-Inheritance-Advanced.pptx
+++ b/Courses/Software-Sciences/Module-1-OOP/09.2-Inheritance-Advanced/09.2-Inheritance-Advanced.pptx
@@ -242,7 +242,7 @@
             </a:lvl1pPr>
           </a:lstStyle>
           <a:p>
-            <a:endParaRPr lang="bg-BG"/>
+            <a:endParaRPr lang="bg-BG" dirty="0"/>
           </a:p>
         </p:txBody>
       </p:sp>
@@ -281,9 +281,9 @@
           <a:p>
             <a:fld id="{4E087215-0C8F-4762-A664-737A353EC9A4}" type="datetimeFigureOut">
               <a:rPr lang="bg-BG" smtClean="0"/>
-              <a:t>21.01.23 г.</a:t>
+              <a:t>17.05.23 г.</a:t>
             </a:fld>
-            <a:endParaRPr lang="bg-BG"/>
+            <a:endParaRPr lang="bg-BG" dirty="0"/>
           </a:p>
         </p:txBody>
       </p:sp>
@@ -439,7 +439,7 @@
             </a:lvl1pPr>
           </a:lstStyle>
           <a:p>
-            <a:endParaRPr lang="en-US"/>
+            <a:endParaRPr lang="en-US" dirty="0"/>
           </a:p>
         </p:txBody>
       </p:sp>
@@ -472,9 +472,9 @@
           <a:p>
             <a:fld id="{72D84649-876A-46C9-8472-14CB09C070D8}" type="datetimeFigureOut">
               <a:rPr lang="en-US" smtClean="0"/>
-              <a:t>1/21/23</a:t>
+              <a:t>5/17/23</a:t>
             </a:fld>
-            <a:endParaRPr lang="en-US"/>
+            <a:endParaRPr lang="en-US" dirty="0"/>
           </a:p>
         </p:txBody>
       </p:sp>
@@ -507,7 +507,7 @@
           <a:bodyPr vert="horz" lIns="91440" tIns="45720" rIns="91440" bIns="45720" rtlCol="0" anchor="ctr"/>
           <a:lstStyle/>
           <a:p>
-            <a:endParaRPr lang="en-US"/>
+            <a:endParaRPr lang="en-US" dirty="0"/>
           </a:p>
         </p:txBody>
       </p:sp>
@@ -1478,7 +1478,7 @@
           <a:bodyPr/>
           <a:lstStyle/>
           <a:p>
-            <a:endParaRPr lang="en-US"/>
+            <a:endParaRPr lang="en-US" dirty="0"/>
           </a:p>
         </p:txBody>
       </p:sp>
@@ -1613,7 +1613,7 @@
           <a:bodyPr/>
           <a:lstStyle/>
           <a:p>
-            <a:endParaRPr lang="en-US"/>
+            <a:endParaRPr lang="en-US" dirty="0"/>
           </a:p>
         </p:txBody>
       </p:sp>
@@ -3752,7 +3752,7 @@
               <a:tabLst/>
               <a:defRPr/>
             </a:pPr>
-            <a:endParaRPr kumimoji="0" lang="en-US" altLang="ko-KR" sz="2398" b="0" i="0" u="none" strike="noStrike" kern="1200" cap="none" spc="0" normalizeH="0" baseline="0" noProof="0">
+            <a:endParaRPr kumimoji="0" lang="en-US" altLang="ko-KR" sz="2398" b="0" i="0" u="none" strike="noStrike" kern="1200" cap="none" spc="0" normalizeH="0" baseline="0" noProof="0" dirty="0">
               <a:ln>
                 <a:noFill/>
               </a:ln>
@@ -4381,7 +4381,7 @@
               <a:tabLst/>
               <a:defRPr/>
             </a:pPr>
-            <a:endParaRPr kumimoji="0" lang="en-US" altLang="ko-KR" sz="2398" b="0" i="0" u="none" strike="noStrike" kern="1200" cap="none" spc="0" normalizeH="0" baseline="0" noProof="0">
+            <a:endParaRPr kumimoji="0" lang="en-US" altLang="ko-KR" sz="2398" b="0" i="0" u="none" strike="noStrike" kern="1200" cap="none" spc="0" normalizeH="0" baseline="0" noProof="0" dirty="0">
               <a:ln>
                 <a:noFill/>
               </a:ln>
@@ -4504,7 +4504,7 @@
               <a:tabLst/>
               <a:defRPr/>
             </a:pPr>
-            <a:endParaRPr kumimoji="0" lang="en-US" altLang="ko-KR" sz="2398" b="0" i="0" u="none" strike="noStrike" kern="1200" cap="none" spc="0" normalizeH="0" baseline="0" noProof="0">
+            <a:endParaRPr kumimoji="0" lang="en-US" altLang="ko-KR" sz="2398" b="0" i="0" u="none" strike="noStrike" kern="1200" cap="none" spc="0" normalizeH="0" baseline="0" noProof="0" dirty="0">
               <a:ln>
                 <a:noFill/>
               </a:ln>
@@ -4777,7 +4777,7 @@
               <a:tabLst/>
               <a:defRPr/>
             </a:pPr>
-            <a:endParaRPr kumimoji="0" lang="en-US" altLang="ko-KR" sz="2398" b="0" i="0" u="none" strike="noStrike" kern="1200" cap="none" spc="0" normalizeH="0" baseline="0" noProof="0">
+            <a:endParaRPr kumimoji="0" lang="en-US" altLang="ko-KR" sz="2398" b="0" i="0" u="none" strike="noStrike" kern="1200" cap="none" spc="0" normalizeH="0" baseline="0" noProof="0" dirty="0">
               <a:ln>
                 <a:noFill/>
               </a:ln>
@@ -4963,7 +4963,7 @@
               <a:pPr/>
               <a:t>‹#›</a:t>
             </a:fld>
-            <a:endParaRPr lang="en-US" noProof="0"/>
+            <a:endParaRPr lang="en-US" noProof="0" dirty="0"/>
           </a:p>
         </p:txBody>
       </p:sp>
@@ -5117,7 +5117,7 @@
           </a:lstStyle>
           <a:p>
             <a:r>
-              <a:rPr lang="en-US" altLang="ko-KR" noProof="0"/>
+              <a:rPr lang="en-US" altLang="ko-KR" noProof="0" dirty="0"/>
               <a:t>Your Picture Here</a:t>
             </a:r>
           </a:p>
@@ -5181,7 +5181,7 @@
               <a:tabLst/>
               <a:defRPr/>
             </a:pPr>
-            <a:endParaRPr kumimoji="0" lang="en-US" altLang="ko-KR" sz="2398" b="0" i="0" u="none" strike="noStrike" kern="1200" cap="none" spc="0" normalizeH="0" baseline="0" noProof="0">
+            <a:endParaRPr kumimoji="0" lang="en-US" altLang="ko-KR" sz="2398" b="0" i="0" u="none" strike="noStrike" kern="1200" cap="none" spc="0" normalizeH="0" baseline="0" noProof="0" dirty="0">
               <a:ln>
                 <a:noFill/>
               </a:ln>
@@ -5256,7 +5256,7 @@
               <a:tabLst/>
               <a:defRPr/>
             </a:pPr>
-            <a:endParaRPr kumimoji="0" lang="en-US" altLang="ko-KR" sz="2398" b="0" i="0" u="none" strike="noStrike" kern="1200" cap="none" spc="0" normalizeH="0" baseline="0" noProof="0">
+            <a:endParaRPr kumimoji="0" lang="en-US" altLang="ko-KR" sz="2398" b="0" i="0" u="none" strike="noStrike" kern="1200" cap="none" spc="0" normalizeH="0" baseline="0" noProof="0" dirty="0">
               <a:ln>
                 <a:noFill/>
               </a:ln>
@@ -5337,7 +5337,7 @@
               <a:tabLst/>
               <a:defRPr/>
             </a:pPr>
-            <a:endParaRPr kumimoji="0" lang="en-US" altLang="ko-KR" sz="2398" b="0" i="0" u="none" strike="noStrike" kern="1200" cap="none" spc="0" normalizeH="0" baseline="0" noProof="0">
+            <a:endParaRPr kumimoji="0" lang="en-US" altLang="ko-KR" sz="2398" b="0" i="0" u="none" strike="noStrike" kern="1200" cap="none" spc="0" normalizeH="0" baseline="0" noProof="0" dirty="0">
               <a:ln>
                 <a:noFill/>
               </a:ln>
@@ -5418,7 +5418,7 @@
               <a:tabLst/>
               <a:defRPr/>
             </a:pPr>
-            <a:endParaRPr kumimoji="0" lang="en-US" altLang="ko-KR" sz="2398" b="0" i="0" u="none" strike="noStrike" kern="1200" cap="none" spc="0" normalizeH="0" baseline="0" noProof="0">
+            <a:endParaRPr kumimoji="0" lang="en-US" altLang="ko-KR" sz="2398" b="0" i="0" u="none" strike="noStrike" kern="1200" cap="none" spc="0" normalizeH="0" baseline="0" noProof="0" dirty="0">
               <a:ln>
                 <a:noFill/>
               </a:ln>
@@ -5622,7 +5622,7 @@
               <a:tabLst/>
               <a:defRPr/>
             </a:pPr>
-            <a:endParaRPr kumimoji="0" lang="en-US" altLang="ko-KR" sz="2398" b="0" i="0" u="none" strike="noStrike" kern="1200" cap="none" spc="0" normalizeH="0" baseline="0" noProof="0">
+            <a:endParaRPr kumimoji="0" lang="en-US" altLang="ko-KR" sz="2398" b="0" i="0" u="none" strike="noStrike" kern="1200" cap="none" spc="0" normalizeH="0" baseline="0" noProof="0" dirty="0">
               <a:ln>
                 <a:noFill/>
               </a:ln>
@@ -7128,7 +7128,7 @@
               <a:tabLst/>
               <a:defRPr/>
             </a:pPr>
-            <a:endParaRPr kumimoji="0" lang="en-US" altLang="ko-KR" sz="2398" b="0" i="0" u="none" strike="noStrike" kern="1200" cap="none" spc="0" normalizeH="0" baseline="0" noProof="0">
+            <a:endParaRPr kumimoji="0" lang="en-US" altLang="ko-KR" sz="2398" b="0" i="0" u="none" strike="noStrike" kern="1200" cap="none" spc="0" normalizeH="0" baseline="0" noProof="0" dirty="0">
               <a:ln>
                 <a:noFill/>
               </a:ln>
@@ -7456,7 +7456,7 @@
               <a:tabLst/>
               <a:defRPr/>
             </a:pPr>
-            <a:endParaRPr kumimoji="0" lang="en-US" altLang="ko-KR" sz="2398" b="0" i="0" u="none" strike="noStrike" kern="1200" cap="none" spc="0" normalizeH="0" baseline="0" noProof="0">
+            <a:endParaRPr kumimoji="0" lang="en-US" altLang="ko-KR" sz="2398" b="0" i="0" u="none" strike="noStrike" kern="1200" cap="none" spc="0" normalizeH="0" baseline="0" noProof="0" dirty="0">
               <a:ln>
                 <a:noFill/>
               </a:ln>
@@ -7626,7 +7626,7 @@
               <a:pPr/>
               <a:t>‹#›</a:t>
             </a:fld>
-            <a:endParaRPr lang="en-US" noProof="0"/>
+            <a:endParaRPr lang="en-US" noProof="0" dirty="0"/>
           </a:p>
         </p:txBody>
       </p:sp>
@@ -7821,7 +7821,7 @@
               <a:tabLst/>
               <a:defRPr/>
             </a:pPr>
-            <a:endParaRPr kumimoji="0" lang="en-US" altLang="ko-KR" sz="2398" b="0" i="0" u="none" strike="noStrike" kern="1200" cap="none" spc="0" normalizeH="0" baseline="0" noProof="0">
+            <a:endParaRPr kumimoji="0" lang="en-US" altLang="ko-KR" sz="2398" b="0" i="0" u="none" strike="noStrike" kern="1200" cap="none" spc="0" normalizeH="0" baseline="0" noProof="0" dirty="0">
               <a:ln>
                 <a:noFill/>
               </a:ln>
@@ -9082,7 +9082,7 @@
               <a:pPr/>
               <a:t>‹#›</a:t>
             </a:fld>
-            <a:endParaRPr lang="en-US" noProof="0"/>
+            <a:endParaRPr lang="en-US" noProof="0" dirty="0"/>
           </a:p>
         </p:txBody>
       </p:sp>
@@ -9150,7 +9150,7 @@
               <a:tabLst/>
               <a:defRPr/>
             </a:pPr>
-            <a:endParaRPr kumimoji="0" lang="en-US" altLang="ko-KR" sz="2398" b="0" i="0" u="none" strike="noStrike" kern="1200" cap="none" spc="0" normalizeH="0" baseline="0" noProof="0">
+            <a:endParaRPr kumimoji="0" lang="en-US" altLang="ko-KR" sz="2398" b="0" i="0" u="none" strike="noStrike" kern="1200" cap="none" spc="0" normalizeH="0" baseline="0" noProof="0" dirty="0">
               <a:ln>
                 <a:noFill/>
               </a:ln>
@@ -9518,7 +9518,7 @@
               <a:tabLst/>
               <a:defRPr/>
             </a:pPr>
-            <a:endParaRPr kumimoji="0" lang="en-US" altLang="ko-KR" sz="2398" b="0" i="0" u="none" strike="noStrike" kern="1200" cap="none" spc="0" normalizeH="0" baseline="0" noProof="0">
+            <a:endParaRPr kumimoji="0" lang="en-US" altLang="ko-KR" sz="2398" b="0" i="0" u="none" strike="noStrike" kern="1200" cap="none" spc="0" normalizeH="0" baseline="0" noProof="0" dirty="0">
               <a:ln>
                 <a:noFill/>
               </a:ln>
@@ -12201,15 +12201,7 @@
           <a:p>
             <a:r>
               <a:rPr lang="en-US" sz="2600" dirty="0"/>
-              <a:t>  void </a:t>
-            </a:r>
-            <a:r>
-              <a:rPr lang="en-US" sz="2600" dirty="0" err="1"/>
-              <a:t>IncrBrightness</a:t>
-            </a:r>
-            <a:r>
-              <a:rPr lang="en-US" sz="2600" dirty="0"/>
-              <a:t>() =&gt;</a:t>
+              <a:t>  void IncrBrightness() =&gt;</a:t>
             </a:r>
           </a:p>
           <a:p>
@@ -12227,15 +12219,7 @@
           <a:p>
             <a:r>
               <a:rPr lang="en-US" sz="2600" dirty="0"/>
-              <a:t>  void </a:t>
-            </a:r>
-            <a:r>
-              <a:rPr lang="en-US" sz="2600" dirty="0" err="1"/>
-              <a:t>DecrBrightness</a:t>
-            </a:r>
-            <a:r>
-              <a:rPr lang="en-US" sz="2600" dirty="0"/>
-              <a:t>() =&gt;</a:t>
+              <a:t>  void DecrBrightness() =&gt;</a:t>
             </a:r>
           </a:p>
           <a:p>
@@ -13481,7 +13465,7 @@
               <a:rPr lang="en-US" dirty="0">
                 <a:hlinkClick r:id="rId3"/>
               </a:rPr>
-              <a:t>https://judge.softuni.bg/Contests/Practice/Index/3164#4</a:t>
+              <a:t>https://judge.softuni.org/Contests/Practice/Index/4065#1</a:t>
             </a:r>
             <a:endParaRPr lang="en-US" dirty="0"/>
           </a:p>
@@ -14287,7 +14271,7 @@
             <a:lstStyle/>
             <a:p>
               <a:pPr algn="ctr"/>
-              <a:endParaRPr lang="ko-KR" altLang="en-US" sz="2399">
+              <a:endParaRPr lang="ko-KR" altLang="en-US" sz="2399" dirty="0">
                 <a:solidFill>
                   <a:schemeClr val="bg1"/>
                 </a:solidFill>
@@ -14348,7 +14332,7 @@
             <a:lstStyle/>
             <a:p>
               <a:pPr algn="ctr"/>
-              <a:endParaRPr lang="ko-KR" altLang="en-US" sz="2399">
+              <a:endParaRPr lang="ko-KR" altLang="en-US" sz="2399" dirty="0">
                 <a:solidFill>
                   <a:schemeClr val="tx1"/>
                 </a:solidFill>
@@ -15186,7 +15170,7 @@
               <a:t>© </a:t>
             </a:r>
             <a:r>
-              <a:rPr lang="bg-BG" dirty="0" err="1"/>
+              <a:rPr lang="bg-BG" dirty="0"/>
               <a:t>СофтУни</a:t>
             </a:r>
             <a:r>
@@ -15447,15 +15431,7 @@
             </a:pPr>
             <a:r>
               <a:rPr lang="bg-BG" sz="3600" dirty="0"/>
-              <a:t>Видове </a:t>
-            </a:r>
-            <a:r>
-              <a:rPr lang="bg-BG" sz="3600" dirty="0" err="1"/>
-              <a:t>преизползване</a:t>
-            </a:r>
-            <a:r>
-              <a:rPr lang="bg-BG" sz="3600" dirty="0"/>
-              <a:t> на класове</a:t>
+              <a:t>Видове преизползване на класове</a:t>
             </a:r>
           </a:p>
           <a:p>
@@ -15956,7 +15932,7 @@
               </a:rPr>
               <a:t>sealed</a:t>
             </a:r>
-            <a:endParaRPr lang="en-BG" b="1" dirty="0">
+            <a:endParaRPr lang="en-BG" b="1">
               <a:latin typeface="Consolas" panose="020B0609020204030204" pitchFamily="49" charset="0"/>
               <a:cs typeface="Consolas" panose="020B0609020204030204" pitchFamily="49" charset="0"/>
             </a:endParaRPr>
@@ -18612,6 +18588,10 @@
           </p:nvPr>
         </p:nvSpPr>
         <p:spPr>
+          <a:xfrm>
+            <a:off x="190402" y="204510"/>
+            <a:ext cx="9715594" cy="882654"/>
+          </a:xfrm>
           <a:prstGeom prst="rect">
             <a:avLst/>
           </a:prstGeom>
@@ -19338,6 +19318,10 @@
           </p:nvPr>
         </p:nvSpPr>
         <p:spPr>
+          <a:xfrm>
+            <a:off x="190402" y="181021"/>
+            <a:ext cx="9715594" cy="882654"/>
+          </a:xfrm>
           <a:prstGeom prst="rect">
             <a:avLst/>
           </a:prstGeom>
@@ -20094,6 +20078,10 @@
           </p:nvPr>
         </p:nvSpPr>
         <p:spPr>
+          <a:xfrm>
+            <a:off x="246000" y="41365"/>
+            <a:ext cx="9715594" cy="1122166"/>
+          </a:xfrm>
           <a:prstGeom prst="rect">
             <a:avLst/>
           </a:prstGeom>
@@ -20439,7 +20427,7 @@
               <a:rPr lang="en-US" dirty="0">
                 <a:hlinkClick r:id="rId3"/>
               </a:rPr>
-              <a:t>https://judge.softuni.bg/Contests/Practice/Index/3164#3</a:t>
+              <a:t>https://judge.softuni.org/Contests/Practice/Index/4065#0</a:t>
             </a:r>
             <a:endParaRPr lang="en-US" dirty="0"/>
           </a:p>

</xml_diff>

<commit_message>
Many fixes, additions, improvements
</commit_message>
<xml_diff>
--- a/Courses/Software-Sciences/Module-1-OOP/09.2-Inheritance-Advanced/09.2-Inheritance-Advanced.pptx
+++ b/Courses/Software-Sciences/Module-1-OOP/09.2-Inheritance-Advanced/09.2-Inheritance-Advanced.pptx
@@ -5,10 +5,10 @@
     <p:sldMasterId id="2147483675" r:id="rId1"/>
   </p:sldMasterIdLst>
   <p:notesMasterIdLst>
-    <p:notesMasterId r:id="rId20"/>
+    <p:notesMasterId r:id="rId22"/>
   </p:notesMasterIdLst>
   <p:handoutMasterIdLst>
-    <p:handoutMasterId r:id="rId21"/>
+    <p:handoutMasterId r:id="rId23"/>
   </p:handoutMasterIdLst>
   <p:sldIdLst>
     <p:sldId id="291" r:id="rId2"/>
@@ -21,14 +21,16 @@
     <p:sldId id="318" r:id="rId9"/>
     <p:sldId id="319" r:id="rId10"/>
     <p:sldId id="495" r:id="rId11"/>
-    <p:sldId id="321" r:id="rId12"/>
-    <p:sldId id="322" r:id="rId13"/>
-    <p:sldId id="323" r:id="rId14"/>
-    <p:sldId id="324" r:id="rId15"/>
-    <p:sldId id="325" r:id="rId16"/>
-    <p:sldId id="326" r:id="rId17"/>
-    <p:sldId id="401" r:id="rId18"/>
-    <p:sldId id="493" r:id="rId19"/>
+    <p:sldId id="499" r:id="rId12"/>
+    <p:sldId id="321" r:id="rId13"/>
+    <p:sldId id="500" r:id="rId14"/>
+    <p:sldId id="322" r:id="rId15"/>
+    <p:sldId id="323" r:id="rId16"/>
+    <p:sldId id="324" r:id="rId17"/>
+    <p:sldId id="325" r:id="rId18"/>
+    <p:sldId id="326" r:id="rId19"/>
+    <p:sldId id="401" r:id="rId20"/>
+    <p:sldId id="493" r:id="rId21"/>
   </p:sldIdLst>
   <p:sldSz cx="12192000" cy="6858000"/>
   <p:notesSz cx="6858000" cy="9144000"/>
@@ -150,7 +152,9 @@
         <p14:section name="Видове преизползване на класове" id="{22E4A757-84FA-4FE3-86D6-D89823336F1F}">
           <p14:sldIdLst>
             <p14:sldId id="495"/>
+            <p14:sldId id="499"/>
             <p14:sldId id="321"/>
+            <p14:sldId id="500"/>
             <p14:sldId id="322"/>
             <p14:sldId id="323"/>
             <p14:sldId id="324"/>
@@ -281,7 +285,7 @@
           <a:p>
             <a:fld id="{4E087215-0C8F-4762-A664-737A353EC9A4}" type="datetimeFigureOut">
               <a:rPr lang="bg-BG" smtClean="0"/>
-              <a:t>17.05.23 г.</a:t>
+              <a:t>2.7.2023 г.</a:t>
             </a:fld>
             <a:endParaRPr lang="bg-BG" dirty="0"/>
           </a:p>
@@ -472,7 +476,7 @@
           <a:p>
             <a:fld id="{72D84649-876A-46C9-8472-14CB09C070D8}" type="datetimeFigureOut">
               <a:rPr lang="en-US" smtClean="0"/>
-              <a:t>5/17/23</a:t>
+              <a:t>2-Jul-23</a:t>
             </a:fld>
             <a:endParaRPr lang="en-US" dirty="0"/>
           </a:p>
@@ -913,54 +917,19 @@
       </p:grpSpPr>
       <p:sp>
         <p:nvSpPr>
-          <p:cNvPr id="9" name="Rectangle 7"/>
+          <p:cNvPr id="2" name="Slide Image Placeholder 1"/>
           <p:cNvSpPr>
-            <a:spLocks noGrp="1" noChangeArrowheads="1"/>
-          </p:cNvSpPr>
-          <p:nvPr>
-            <p:ph type="sldNum" sz="quarter" idx="5"/>
-          </p:nvPr>
-        </p:nvSpPr>
-        <p:spPr>
-          <a:ln/>
-        </p:spPr>
-        <p:txBody>
-          <a:bodyPr/>
-          <a:lstStyle/>
-          <a:p>
-            <a:fld id="{332C4CEC-2DBE-4C38-BA31-7DE965C3FA11}" type="slidenum">
-              <a:rPr lang="en-US"/>
-              <a:pPr/>
-              <a:t>14</a:t>
-            </a:fld>
-            <a:r>
-              <a:rPr lang="en-US" dirty="0"/>
-              <a:t>##</a:t>
-            </a:r>
-          </a:p>
-        </p:txBody>
-      </p:sp>
-      <p:sp>
-        <p:nvSpPr>
-          <p:cNvPr id="54274" name="Slide Image Placeholder 1"/>
-          <p:cNvSpPr>
-            <a:spLocks noGrp="1" noRot="1" noChangeAspect="1" noTextEdit="1"/>
+            <a:spLocks noGrp="1" noRot="1" noChangeAspect="1"/>
           </p:cNvSpPr>
           <p:nvPr>
             <p:ph type="sldImg"/>
           </p:nvPr>
         </p:nvSpPr>
-        <p:spPr>
-          <a:xfrm>
-            <a:off x="381000" y="685800"/>
-            <a:ext cx="6096000" cy="3429000"/>
-          </a:xfrm>
-          <a:ln/>
-        </p:spPr>
-      </p:sp>
-      <p:sp>
-        <p:nvSpPr>
-          <p:cNvPr id="54275" name="Notes Placeholder 2"/>
+        <p:spPr/>
+      </p:sp>
+      <p:sp>
+        <p:nvSpPr>
+          <p:cNvPr id="3" name="Notes Placeholder 2"/>
           <p:cNvSpPr>
             <a:spLocks noGrp="1"/>
           </p:cNvSpPr>
@@ -973,19 +942,18 @@
           <a:bodyPr/>
           <a:lstStyle/>
           <a:p>
-            <a:pPr eaLnBrk="1" hangingPunct="1"/>
-            <a:endParaRPr lang="en-US" dirty="0"/>
+            <a:endParaRPr lang="en-GB" dirty="0"/>
           </a:p>
         </p:txBody>
       </p:sp>
       <p:sp>
         <p:nvSpPr>
-          <p:cNvPr id="54276" name="Header Placeholder 3"/>
+          <p:cNvPr id="5" name="Slide Number Placeholder 4"/>
           <p:cNvSpPr>
             <a:spLocks noGrp="1"/>
           </p:cNvSpPr>
           <p:nvPr>
-            <p:ph type="hdr" sz="quarter"/>
+            <p:ph type="sldNum" sz="quarter" idx="11"/>
           </p:nvPr>
         </p:nvSpPr>
         <p:spPr/>
@@ -993,120 +961,21 @@
           <a:bodyPr/>
           <a:lstStyle/>
           <a:p>
-            <a:r>
-              <a:rPr lang="en-US" dirty="0"/>
-              <a:t>*</a:t>
-            </a:r>
+            <a:fld id="{3EBA5BD7-F043-4D1B-AA17-CD412FC534DE}" type="slidenum">
+              <a:rPr lang="en-US" smtClean="0"/>
+              <a:pPr/>
+              <a:t>15</a:t>
+            </a:fld>
+            <a:endParaRPr lang="en-US" dirty="0"/>
           </a:p>
         </p:txBody>
       </p:sp>
       <p:sp>
         <p:nvSpPr>
-          <p:cNvPr id="54277" name="Date Placeholder 4"/>
-          <p:cNvSpPr>
-            <a:spLocks noGrp="1"/>
-          </p:cNvSpPr>
-          <p:nvPr>
-            <p:ph type="dt" sz="quarter" idx="1"/>
-          </p:nvPr>
-        </p:nvSpPr>
-        <p:spPr/>
-        <p:txBody>
-          <a:bodyPr/>
-          <a:lstStyle/>
-          <a:p>
-            <a:r>
-              <a:rPr lang="en-US" dirty="0"/>
-              <a:t>07/16/96</a:t>
-            </a:r>
-          </a:p>
-        </p:txBody>
-      </p:sp>
-      <p:sp>
-        <p:nvSpPr>
-          <p:cNvPr id="54278" name="Footer Placeholder 5"/>
-          <p:cNvSpPr txBox="1">
-            <a:spLocks noGrp="1"/>
-          </p:cNvSpPr>
-          <p:nvPr/>
-        </p:nvSpPr>
-        <p:spPr bwMode="auto">
-          <a:xfrm>
-            <a:off x="1" y="8687297"/>
-            <a:ext cx="2972004" cy="456703"/>
-          </a:xfrm>
-          <a:prstGeom prst="rect">
-            <a:avLst/>
-          </a:prstGeom>
-          <a:noFill/>
-          <a:ln w="9525">
-            <a:noFill/>
-            <a:miter lim="800000"/>
-            <a:headEnd/>
-            <a:tailEnd/>
-          </a:ln>
-        </p:spPr>
-        <p:txBody>
-          <a:bodyPr lIns="19047" tIns="0" rIns="19047" bIns="0" anchor="b"/>
-          <a:lstStyle/>
-          <a:p>
-            <a:pPr defTabSz="914450"/>
-            <a:r>
-              <a:rPr lang="en-US" sz="1000" i="1" dirty="0"/>
-              <a:t>(c) 2006 National Academy for Software Development - http://academy.devbg.org*</a:t>
-            </a:r>
-            <a:endParaRPr lang="en-US" sz="1200" i="1" dirty="0"/>
-          </a:p>
-        </p:txBody>
-      </p:sp>
-      <p:sp>
-        <p:nvSpPr>
-          <p:cNvPr id="54279" name="Slide Number Placeholder 6"/>
-          <p:cNvSpPr txBox="1">
-            <a:spLocks noGrp="1"/>
-          </p:cNvSpPr>
-          <p:nvPr/>
-        </p:nvSpPr>
-        <p:spPr bwMode="auto">
-          <a:xfrm>
-            <a:off x="3885996" y="8687297"/>
-            <a:ext cx="2972004" cy="456703"/>
-          </a:xfrm>
-          <a:prstGeom prst="rect">
-            <a:avLst/>
-          </a:prstGeom>
-          <a:noFill/>
-          <a:ln w="9525">
-            <a:noFill/>
-            <a:miter lim="800000"/>
-            <a:headEnd/>
-            <a:tailEnd/>
-          </a:ln>
-        </p:spPr>
-        <p:txBody>
-          <a:bodyPr lIns="19047" tIns="0" rIns="19047" bIns="0" anchor="b"/>
-          <a:lstStyle/>
-          <a:p>
-            <a:pPr algn="r" defTabSz="914450"/>
-            <a:fld id="{1CAF241F-65C9-4E85-866D-33A924D9866A}" type="slidenum">
-              <a:rPr lang="en-US" sz="1000" i="1"/>
-              <a:pPr algn="r" defTabSz="914450"/>
-              <a:t>14</a:t>
-            </a:fld>
-            <a:r>
-              <a:rPr lang="en-US" sz="1000" i="1" dirty="0"/>
-              <a:t>##</a:t>
-            </a:r>
-            <a:endParaRPr lang="en-US" sz="1200" i="1" dirty="0"/>
-          </a:p>
-        </p:txBody>
-      </p:sp>
-      <p:sp>
-        <p:nvSpPr>
-          <p:cNvPr id="10" name="Footer Placeholder 7">
+          <p:cNvPr id="6" name="Footer Placeholder 7">
             <a:extLst>
               <a:ext uri="{FF2B5EF4-FFF2-40B4-BE49-F238E27FC236}">
-                <a16:creationId xmlns:a16="http://schemas.microsoft.com/office/drawing/2014/main" id="{72B0CE86-8308-47A9-9930-4B85E8624BBF}"/>
+                <a16:creationId xmlns:a16="http://schemas.microsoft.com/office/drawing/2014/main" id="{8F05106B-DEEC-407A-A47D-950478CAB34A}"/>
               </a:ext>
             </a:extLst>
           </p:cNvPr>
@@ -1154,7 +1023,7 @@
     </p:spTree>
     <p:extLst>
       <p:ext uri="{BB962C8B-B14F-4D97-AF65-F5344CB8AC3E}">
-        <p14:creationId xmlns:p14="http://schemas.microsoft.com/office/powerpoint/2010/main" val="3317762137"/>
+        <p14:creationId xmlns:p14="http://schemas.microsoft.com/office/powerpoint/2010/main" val="3815244259"/>
       </p:ext>
     </p:extLst>
   </p:cSld>
@@ -1201,7 +1070,7 @@
             <a:fld id="{332C4CEC-2DBE-4C38-BA31-7DE965C3FA11}" type="slidenum">
               <a:rPr lang="en-US"/>
               <a:pPr/>
-              <a:t>15</a:t>
+              <a:t>16</a:t>
             </a:fld>
             <a:r>
               <a:rPr lang="en-US" dirty="0"/>
@@ -1361,7 +1230,7 @@
             <a:fld id="{1CAF241F-65C9-4E85-866D-33A924D9866A}" type="slidenum">
               <a:rPr lang="en-US" sz="1000" i="1"/>
               <a:pPr algn="r" defTabSz="914450"/>
-              <a:t>15</a:t>
+              <a:t>16</a:t>
             </a:fld>
             <a:r>
               <a:rPr lang="en-US" sz="1000" i="1" dirty="0"/>
@@ -1376,7 +1245,7 @@
           <p:cNvPr id="10" name="Footer Placeholder 7">
             <a:extLst>
               <a:ext uri="{FF2B5EF4-FFF2-40B4-BE49-F238E27FC236}">
-                <a16:creationId xmlns:a16="http://schemas.microsoft.com/office/drawing/2014/main" id="{98DC522B-3196-4E94-B548-2DD8D5CE3B40}"/>
+                <a16:creationId xmlns:a16="http://schemas.microsoft.com/office/drawing/2014/main" id="{72B0CE86-8308-47A9-9930-4B85E8624BBF}"/>
               </a:ext>
             </a:extLst>
           </p:cNvPr>
@@ -1424,7 +1293,7 @@
     </p:spTree>
     <p:extLst>
       <p:ext uri="{BB962C8B-B14F-4D97-AF65-F5344CB8AC3E}">
-        <p14:creationId xmlns:p14="http://schemas.microsoft.com/office/powerpoint/2010/main" val="1690420446"/>
+        <p14:creationId xmlns:p14="http://schemas.microsoft.com/office/powerpoint/2010/main" val="3317762137"/>
       </p:ext>
     </p:extLst>
   </p:cSld>
@@ -1453,19 +1322,54 @@
       </p:grpSpPr>
       <p:sp>
         <p:nvSpPr>
-          <p:cNvPr id="2" name="Slide Image Placeholder 1"/>
+          <p:cNvPr id="9" name="Rectangle 7"/>
           <p:cNvSpPr>
-            <a:spLocks noGrp="1" noRot="1" noChangeAspect="1"/>
+            <a:spLocks noGrp="1" noChangeArrowheads="1"/>
+          </p:cNvSpPr>
+          <p:nvPr>
+            <p:ph type="sldNum" sz="quarter" idx="5"/>
+          </p:nvPr>
+        </p:nvSpPr>
+        <p:spPr>
+          <a:ln/>
+        </p:spPr>
+        <p:txBody>
+          <a:bodyPr/>
+          <a:lstStyle/>
+          <a:p>
+            <a:fld id="{332C4CEC-2DBE-4C38-BA31-7DE965C3FA11}" type="slidenum">
+              <a:rPr lang="en-US"/>
+              <a:pPr/>
+              <a:t>17</a:t>
+            </a:fld>
+            <a:r>
+              <a:rPr lang="en-US" dirty="0"/>
+              <a:t>##</a:t>
+            </a:r>
+          </a:p>
+        </p:txBody>
+      </p:sp>
+      <p:sp>
+        <p:nvSpPr>
+          <p:cNvPr id="54274" name="Slide Image Placeholder 1"/>
+          <p:cNvSpPr>
+            <a:spLocks noGrp="1" noRot="1" noChangeAspect="1" noTextEdit="1"/>
           </p:cNvSpPr>
           <p:nvPr>
             <p:ph type="sldImg"/>
           </p:nvPr>
         </p:nvSpPr>
-        <p:spPr/>
-      </p:sp>
-      <p:sp>
-        <p:nvSpPr>
-          <p:cNvPr id="3" name="Notes Placeholder 2"/>
+        <p:spPr>
+          <a:xfrm>
+            <a:off x="381000" y="685800"/>
+            <a:ext cx="6096000" cy="3429000"/>
+          </a:xfrm>
+          <a:ln/>
+        </p:spPr>
+      </p:sp>
+      <p:sp>
+        <p:nvSpPr>
+          <p:cNvPr id="54275" name="Notes Placeholder 2"/>
           <p:cNvSpPr>
             <a:spLocks noGrp="1"/>
           </p:cNvSpPr>
@@ -1478,18 +1382,19 @@
           <a:bodyPr/>
           <a:lstStyle/>
           <a:p>
+            <a:pPr eaLnBrk="1" hangingPunct="1"/>
             <a:endParaRPr lang="en-US" dirty="0"/>
           </a:p>
         </p:txBody>
       </p:sp>
       <p:sp>
         <p:nvSpPr>
-          <p:cNvPr id="5" name="Slide Number Placeholder 4"/>
+          <p:cNvPr id="54276" name="Header Placeholder 3"/>
           <p:cNvSpPr>
             <a:spLocks noGrp="1"/>
           </p:cNvSpPr>
           <p:nvPr>
-            <p:ph type="sldNum" sz="quarter" idx="11"/>
+            <p:ph type="hdr" sz="quarter"/>
           </p:nvPr>
         </p:nvSpPr>
         <p:spPr/>
@@ -1497,21 +1402,120 @@
           <a:bodyPr/>
           <a:lstStyle/>
           <a:p>
-            <a:fld id="{3EBA5BD7-F043-4D1B-AA17-CD412FC534DE}" type="slidenum">
-              <a:rPr lang="en-US" smtClean="0"/>
-              <a:pPr/>
-              <a:t>16</a:t>
+            <a:r>
+              <a:rPr lang="en-US" dirty="0"/>
+              <a:t>*</a:t>
+            </a:r>
+          </a:p>
+        </p:txBody>
+      </p:sp>
+      <p:sp>
+        <p:nvSpPr>
+          <p:cNvPr id="54277" name="Date Placeholder 4"/>
+          <p:cNvSpPr>
+            <a:spLocks noGrp="1"/>
+          </p:cNvSpPr>
+          <p:nvPr>
+            <p:ph type="dt" sz="quarter" idx="1"/>
+          </p:nvPr>
+        </p:nvSpPr>
+        <p:spPr/>
+        <p:txBody>
+          <a:bodyPr/>
+          <a:lstStyle/>
+          <a:p>
+            <a:r>
+              <a:rPr lang="en-US" dirty="0"/>
+              <a:t>07/16/96</a:t>
+            </a:r>
+          </a:p>
+        </p:txBody>
+      </p:sp>
+      <p:sp>
+        <p:nvSpPr>
+          <p:cNvPr id="54278" name="Footer Placeholder 5"/>
+          <p:cNvSpPr txBox="1">
+            <a:spLocks noGrp="1"/>
+          </p:cNvSpPr>
+          <p:nvPr/>
+        </p:nvSpPr>
+        <p:spPr bwMode="auto">
+          <a:xfrm>
+            <a:off x="1" y="8687297"/>
+            <a:ext cx="2972004" cy="456703"/>
+          </a:xfrm>
+          <a:prstGeom prst="rect">
+            <a:avLst/>
+          </a:prstGeom>
+          <a:noFill/>
+          <a:ln w="9525">
+            <a:noFill/>
+            <a:miter lim="800000"/>
+            <a:headEnd/>
+            <a:tailEnd/>
+          </a:ln>
+        </p:spPr>
+        <p:txBody>
+          <a:bodyPr lIns="19047" tIns="0" rIns="19047" bIns="0" anchor="b"/>
+          <a:lstStyle/>
+          <a:p>
+            <a:pPr defTabSz="914450"/>
+            <a:r>
+              <a:rPr lang="en-US" sz="1000" i="1" dirty="0"/>
+              <a:t>(c) 2006 National Academy for Software Development - http://academy.devbg.org*</a:t>
+            </a:r>
+            <a:endParaRPr lang="en-US" sz="1200" i="1" dirty="0"/>
+          </a:p>
+        </p:txBody>
+      </p:sp>
+      <p:sp>
+        <p:nvSpPr>
+          <p:cNvPr id="54279" name="Slide Number Placeholder 6"/>
+          <p:cNvSpPr txBox="1">
+            <a:spLocks noGrp="1"/>
+          </p:cNvSpPr>
+          <p:nvPr/>
+        </p:nvSpPr>
+        <p:spPr bwMode="auto">
+          <a:xfrm>
+            <a:off x="3885996" y="8687297"/>
+            <a:ext cx="2972004" cy="456703"/>
+          </a:xfrm>
+          <a:prstGeom prst="rect">
+            <a:avLst/>
+          </a:prstGeom>
+          <a:noFill/>
+          <a:ln w="9525">
+            <a:noFill/>
+            <a:miter lim="800000"/>
+            <a:headEnd/>
+            <a:tailEnd/>
+          </a:ln>
+        </p:spPr>
+        <p:txBody>
+          <a:bodyPr lIns="19047" tIns="0" rIns="19047" bIns="0" anchor="b"/>
+          <a:lstStyle/>
+          <a:p>
+            <a:pPr algn="r" defTabSz="914450"/>
+            <a:fld id="{1CAF241F-65C9-4E85-866D-33A924D9866A}" type="slidenum">
+              <a:rPr lang="en-US" sz="1000" i="1"/>
+              <a:pPr algn="r" defTabSz="914450"/>
+              <a:t>17</a:t>
             </a:fld>
-            <a:endParaRPr lang="en-US" dirty="0"/>
+            <a:r>
+              <a:rPr lang="en-US" sz="1000" i="1" dirty="0"/>
+              <a:t>##</a:t>
+            </a:r>
+            <a:endParaRPr lang="en-US" sz="1200" i="1" dirty="0"/>
           </a:p>
         </p:txBody>
       </p:sp>
       <p:sp>
         <p:nvSpPr>
-          <p:cNvPr id="6" name="Footer Placeholder 7">
+          <p:cNvPr id="10" name="Footer Placeholder 7">
             <a:extLst>
               <a:ext uri="{FF2B5EF4-FFF2-40B4-BE49-F238E27FC236}">
-                <a16:creationId xmlns:a16="http://schemas.microsoft.com/office/drawing/2014/main" id="{9B06890D-5EEB-420A-9FC0-F14D0F047CF7}"/>
+                <a16:creationId xmlns:a16="http://schemas.microsoft.com/office/drawing/2014/main" id="{98DC522B-3196-4E94-B548-2DD8D5CE3B40}"/>
               </a:ext>
             </a:extLst>
           </p:cNvPr>
@@ -1559,6 +1563,141 @@
     </p:spTree>
     <p:extLst>
       <p:ext uri="{BB962C8B-B14F-4D97-AF65-F5344CB8AC3E}">
+        <p14:creationId xmlns:p14="http://schemas.microsoft.com/office/powerpoint/2010/main" val="1690420446"/>
+      </p:ext>
+    </p:extLst>
+  </p:cSld>
+  <p:clrMapOvr>
+    <a:masterClrMapping/>
+  </p:clrMapOvr>
+</p:notes>
+</file>
+
+<file path=ppt/notesSlides/notesSlide13.xml><?xml version="1.0" encoding="utf-8"?>
+<p:notes xmlns:a="http://schemas.openxmlformats.org/drawingml/2006/main" xmlns:r="http://schemas.openxmlformats.org/officeDocument/2006/relationships" xmlns:p="http://schemas.openxmlformats.org/presentationml/2006/main">
+  <p:cSld>
+    <p:spTree>
+      <p:nvGrpSpPr>
+        <p:cNvPr id="1" name=""/>
+        <p:cNvGrpSpPr/>
+        <p:nvPr/>
+      </p:nvGrpSpPr>
+      <p:grpSpPr>
+        <a:xfrm>
+          <a:off x="0" y="0"/>
+          <a:ext cx="0" cy="0"/>
+          <a:chOff x="0" y="0"/>
+          <a:chExt cx="0" cy="0"/>
+        </a:xfrm>
+      </p:grpSpPr>
+      <p:sp>
+        <p:nvSpPr>
+          <p:cNvPr id="2" name="Slide Image Placeholder 1"/>
+          <p:cNvSpPr>
+            <a:spLocks noGrp="1" noRot="1" noChangeAspect="1"/>
+          </p:cNvSpPr>
+          <p:nvPr>
+            <p:ph type="sldImg"/>
+          </p:nvPr>
+        </p:nvSpPr>
+        <p:spPr/>
+      </p:sp>
+      <p:sp>
+        <p:nvSpPr>
+          <p:cNvPr id="3" name="Notes Placeholder 2"/>
+          <p:cNvSpPr>
+            <a:spLocks noGrp="1"/>
+          </p:cNvSpPr>
+          <p:nvPr>
+            <p:ph type="body" idx="1"/>
+          </p:nvPr>
+        </p:nvSpPr>
+        <p:spPr/>
+        <p:txBody>
+          <a:bodyPr/>
+          <a:lstStyle/>
+          <a:p>
+            <a:endParaRPr lang="en-US" dirty="0"/>
+          </a:p>
+        </p:txBody>
+      </p:sp>
+      <p:sp>
+        <p:nvSpPr>
+          <p:cNvPr id="5" name="Slide Number Placeholder 4"/>
+          <p:cNvSpPr>
+            <a:spLocks noGrp="1"/>
+          </p:cNvSpPr>
+          <p:nvPr>
+            <p:ph type="sldNum" sz="quarter" idx="11"/>
+          </p:nvPr>
+        </p:nvSpPr>
+        <p:spPr/>
+        <p:txBody>
+          <a:bodyPr/>
+          <a:lstStyle/>
+          <a:p>
+            <a:fld id="{3EBA5BD7-F043-4D1B-AA17-CD412FC534DE}" type="slidenum">
+              <a:rPr lang="en-US" smtClean="0"/>
+              <a:pPr/>
+              <a:t>18</a:t>
+            </a:fld>
+            <a:endParaRPr lang="en-US" dirty="0"/>
+          </a:p>
+        </p:txBody>
+      </p:sp>
+      <p:sp>
+        <p:nvSpPr>
+          <p:cNvPr id="6" name="Footer Placeholder 7">
+            <a:extLst>
+              <a:ext uri="{FF2B5EF4-FFF2-40B4-BE49-F238E27FC236}">
+                <a16:creationId xmlns:a16="http://schemas.microsoft.com/office/drawing/2014/main" id="{9B06890D-5EEB-420A-9FC0-F14D0F047CF7}"/>
+              </a:ext>
+            </a:extLst>
+          </p:cNvPr>
+          <p:cNvSpPr>
+            <a:spLocks noGrp="1"/>
+          </p:cNvSpPr>
+          <p:nvPr>
+            <p:ph type="ftr" sz="quarter" idx="4"/>
+          </p:nvPr>
+        </p:nvSpPr>
+        <p:spPr>
+          <a:xfrm>
+            <a:off x="-1" y="8847000"/>
+            <a:ext cx="6488999" cy="297000"/>
+          </a:xfrm>
+          <a:prstGeom prst="rect">
+            <a:avLst/>
+          </a:prstGeom>
+        </p:spPr>
+        <p:txBody>
+          <a:bodyPr vert="horz" lIns="91440" tIns="45720" rIns="91440" bIns="45720" rtlCol="0" anchor="b"/>
+          <a:lstStyle>
+            <a:lvl1pPr algn="l">
+              <a:defRPr sz="1100"/>
+            </a:lvl1pPr>
+          </a:lstStyle>
+          <a:p>
+            <a:r>
+              <a:rPr lang="en-US" dirty="0"/>
+              <a:t>© SoftUni – </a:t>
+            </a:r>
+            <a:r>
+              <a:rPr lang="en-US" u="sng" dirty="0">
+                <a:hlinkClick r:id="rId3"/>
+              </a:rPr>
+              <a:t>https://softuni.org</a:t>
+            </a:r>
+            <a:r>
+              <a:rPr lang="en-US" dirty="0"/>
+              <a:t>. Copyrighted document. Unauthorized copy or reproduction is not permitted.</a:t>
+            </a:r>
+          </a:p>
+        </p:txBody>
+      </p:sp>
+    </p:spTree>
+    <p:extLst>
+      <p:ext uri="{BB962C8B-B14F-4D97-AF65-F5344CB8AC3E}">
         <p14:creationId xmlns:p14="http://schemas.microsoft.com/office/powerpoint/2010/main" val="1165365046"/>
       </p:ext>
     </p:extLst>
@@ -1569,7 +1708,7 @@
 </p:notes>
 </file>
 
-<file path=ppt/notesSlides/notesSlide13.xml><?xml version="1.0" encoding="utf-8"?>
+<file path=ppt/notesSlides/notesSlide14.xml><?xml version="1.0" encoding="utf-8"?>
 <p:notes xmlns:a="http://schemas.openxmlformats.org/drawingml/2006/main" xmlns:r="http://schemas.openxmlformats.org/officeDocument/2006/relationships" xmlns:p="http://schemas.openxmlformats.org/presentationml/2006/main">
   <p:cSld>
     <p:spTree>
@@ -1741,7 +1880,7 @@
             <a:fld id="{3EBA5BD7-F043-4D1B-AA17-CD412FC534DE}" type="slidenum">
               <a:rPr lang="en-US" smtClean="0"/>
               <a:pPr/>
-              <a:t>17</a:t>
+              <a:t>19</a:t>
             </a:fld>
             <a:endParaRPr lang="en-US" dirty="0"/>
           </a:p>
@@ -1810,7 +1949,7 @@
 </p:notes>
 </file>
 
-<file path=ppt/notesSlides/notesSlide14.xml><?xml version="1.0" encoding="utf-8"?>
+<file path=ppt/notesSlides/notesSlide15.xml><?xml version="1.0" encoding="utf-8"?>
 <p:notes xmlns:a="http://schemas.openxmlformats.org/drawingml/2006/main" xmlns:r="http://schemas.openxmlformats.org/officeDocument/2006/relationships" xmlns:p="http://schemas.openxmlformats.org/presentationml/2006/main">
   <p:cSld>
     <p:spTree>
@@ -1982,7 +2121,7 @@
             <a:fld id="{3EBA5BD7-F043-4D1B-AA17-CD412FC534DE}" type="slidenum">
               <a:rPr lang="en-US" smtClean="0"/>
               <a:pPr/>
-              <a:t>18</a:t>
+              <a:t>20</a:t>
             </a:fld>
             <a:endParaRPr lang="en-US" dirty="0"/>
           </a:p>
@@ -3332,7 +3471,7 @@
             <a:fld id="{3EBA5BD7-F043-4D1B-AA17-CD412FC534DE}" type="slidenum">
               <a:rPr lang="en-US" smtClean="0"/>
               <a:pPr/>
-              <a:t>11</a:t>
+              <a:t>12</a:t>
             </a:fld>
             <a:endParaRPr lang="en-US" dirty="0"/>
           </a:p>
@@ -3467,7 +3606,7 @@
             <a:fld id="{3EBA5BD7-F043-4D1B-AA17-CD412FC534DE}" type="slidenum">
               <a:rPr lang="en-US" smtClean="0"/>
               <a:pPr/>
-              <a:t>12</a:t>
+              <a:t>13</a:t>
             </a:fld>
             <a:endParaRPr lang="en-US" dirty="0"/>
           </a:p>
@@ -3478,7 +3617,7 @@
           <p:cNvPr id="6" name="Footer Placeholder 7">
             <a:extLst>
               <a:ext uri="{FF2B5EF4-FFF2-40B4-BE49-F238E27FC236}">
-                <a16:creationId xmlns:a16="http://schemas.microsoft.com/office/drawing/2014/main" id="{75A4E7A0-FEE2-42C2-A689-4B3992BCE1E0}"/>
+                <a16:creationId xmlns:a16="http://schemas.microsoft.com/office/drawing/2014/main" id="{7615004F-EAD0-4523-BF1B-B43BEF34C061}"/>
               </a:ext>
             </a:extLst>
           </p:cNvPr>
@@ -3526,7 +3665,7 @@
     </p:spTree>
     <p:extLst>
       <p:ext uri="{BB962C8B-B14F-4D97-AF65-F5344CB8AC3E}">
-        <p14:creationId xmlns:p14="http://schemas.microsoft.com/office/powerpoint/2010/main" val="2866178310"/>
+        <p14:creationId xmlns:p14="http://schemas.microsoft.com/office/powerpoint/2010/main" val="1420532948"/>
       </p:ext>
     </p:extLst>
   </p:cSld>
@@ -3602,7 +3741,7 @@
             <a:fld id="{3EBA5BD7-F043-4D1B-AA17-CD412FC534DE}" type="slidenum">
               <a:rPr lang="en-US" smtClean="0"/>
               <a:pPr/>
-              <a:t>13</a:t>
+              <a:t>14</a:t>
             </a:fld>
             <a:endParaRPr lang="en-US" dirty="0"/>
           </a:p>
@@ -3613,7 +3752,7 @@
           <p:cNvPr id="6" name="Footer Placeholder 7">
             <a:extLst>
               <a:ext uri="{FF2B5EF4-FFF2-40B4-BE49-F238E27FC236}">
-                <a16:creationId xmlns:a16="http://schemas.microsoft.com/office/drawing/2014/main" id="{8F05106B-DEEC-407A-A47D-950478CAB34A}"/>
+                <a16:creationId xmlns:a16="http://schemas.microsoft.com/office/drawing/2014/main" id="{75A4E7A0-FEE2-42C2-A689-4B3992BCE1E0}"/>
               </a:ext>
             </a:extLst>
           </p:cNvPr>
@@ -3661,7 +3800,7 @@
     </p:spTree>
     <p:extLst>
       <p:ext uri="{BB962C8B-B14F-4D97-AF65-F5344CB8AC3E}">
-        <p14:creationId xmlns:p14="http://schemas.microsoft.com/office/powerpoint/2010/main" val="3815244259"/>
+        <p14:creationId xmlns:p14="http://schemas.microsoft.com/office/powerpoint/2010/main" val="2866178310"/>
       </p:ext>
     </p:extLst>
   </p:cSld>
@@ -10263,13 +10402,13 @@
         <p:spPr/>
         <p:txBody>
           <a:bodyPr>
-            <a:normAutofit/>
+            <a:normAutofit fontScale="92500"/>
           </a:bodyPr>
           <a:lstStyle/>
           <a:p>
             <a:r>
               <a:rPr lang="bg-BG" dirty="0"/>
-              <a:t>Йерархия на класовете</a:t>
+              <a:t>Виртуални методи и преизползване на код, ОО моделиране,  разширяване на клас, асоциация, композиция, делегация</a:t>
             </a:r>
             <a:endParaRPr lang="en-US" dirty="0"/>
           </a:p>
@@ -10294,7 +10433,7 @@
           <a:p>
             <a:r>
               <a:rPr lang="bg-BG" dirty="0"/>
-              <a:t>Наследяване</a:t>
+              <a:t>Наследяване – продължение</a:t>
             </a:r>
             <a:endParaRPr lang="en-US" dirty="0"/>
           </a:p>
@@ -10333,8 +10472,8 @@
         </p:blipFill>
         <p:spPr bwMode="auto">
           <a:xfrm>
-            <a:off x="4161000" y="1823105"/>
-            <a:ext cx="3483131" cy="3483131"/>
+            <a:off x="4838089" y="2817137"/>
+            <a:ext cx="2162750" cy="2162750"/>
           </a:xfrm>
           <a:prstGeom prst="rect">
             <a:avLst/>
@@ -10434,6 +10573,48 @@
       </p:pic>
       <p:sp>
         <p:nvSpPr>
+          <p:cNvPr id="4" name="Subtitle 3">
+            <a:extLst>
+              <a:ext uri="{FF2B5EF4-FFF2-40B4-BE49-F238E27FC236}">
+                <a16:creationId xmlns:a16="http://schemas.microsoft.com/office/drawing/2014/main" id="{60CCB5FD-0064-52E5-B9EF-897024D8DD6E}"/>
+              </a:ext>
+            </a:extLst>
+          </p:cNvPr>
+          <p:cNvSpPr>
+            <a:spLocks noGrp="1"/>
+          </p:cNvSpPr>
+          <p:nvPr>
+            <p:ph type="subTitle" sz="quarter" idx="11"/>
+          </p:nvPr>
+        </p:nvSpPr>
+        <p:spPr>
+          <a:xfrm>
+            <a:off x="614363" y="5675650"/>
+            <a:ext cx="10963275" cy="768350"/>
+          </a:xfrm>
+        </p:spPr>
+        <p:txBody>
+          <a:bodyPr/>
+          <a:lstStyle/>
+          <a:p>
+            <a:r>
+              <a:rPr lang="bg-BG" dirty="0"/>
+              <a:t>Разширяване</a:t>
+            </a:r>
+            <a:r>
+              <a:rPr lang="en-US" dirty="0"/>
+              <a:t>, </a:t>
+            </a:r>
+            <a:r>
+              <a:rPr lang="bg-BG" dirty="0"/>
+              <a:t>композиция, делегиране</a:t>
+            </a:r>
+            <a:endParaRPr lang="en-US" dirty="0"/>
+          </a:p>
+        </p:txBody>
+      </p:sp>
+      <p:sp>
+        <p:nvSpPr>
           <p:cNvPr id="3" name="Title 2">
             <a:extLst>
               <a:ext uri="{FF2B5EF4-FFF2-40B4-BE49-F238E27FC236}">
@@ -10448,24 +10629,21 @@
             <p:ph type="title" sz="quarter" idx="10"/>
           </p:nvPr>
         </p:nvSpPr>
-        <p:spPr/>
+        <p:spPr>
+          <a:xfrm>
+            <a:off x="614363" y="4794587"/>
+            <a:ext cx="10963275" cy="768350"/>
+          </a:xfrm>
+        </p:spPr>
         <p:txBody>
           <a:bodyPr/>
           <a:lstStyle/>
           <a:p>
             <a:r>
-              <a:rPr lang="bg-BG" sz="4800" dirty="0"/>
-              <a:t>Разширяване</a:t>
-            </a:r>
-            <a:r>
-              <a:rPr lang="en-US" sz="4800" dirty="0"/>
-              <a:t>, </a:t>
-            </a:r>
-            <a:r>
-              <a:rPr lang="bg-BG" sz="4800" dirty="0"/>
-              <a:t>композиция, делегиране</a:t>
-            </a:r>
-            <a:endParaRPr lang="en-US" sz="4800" dirty="0"/>
+              <a:rPr lang="bg-BG" dirty="0"/>
+              <a:t>Обектно-ориентирано моделиране</a:t>
+            </a:r>
+            <a:endParaRPr lang="en-US" dirty="0"/>
           </a:p>
         </p:txBody>
       </p:sp>
@@ -10509,6 +10687,594 @@
       </p:grpSpPr>
       <p:sp>
         <p:nvSpPr>
+          <p:cNvPr id="2" name="Slide Number Placeholder 1">
+            <a:extLst>
+              <a:ext uri="{FF2B5EF4-FFF2-40B4-BE49-F238E27FC236}">
+                <a16:creationId xmlns:a16="http://schemas.microsoft.com/office/drawing/2014/main" id="{BA65E8CB-2D7F-757A-288C-8F9E23E7B4EC}"/>
+              </a:ext>
+            </a:extLst>
+          </p:cNvPr>
+          <p:cNvSpPr>
+            <a:spLocks noGrp="1"/>
+          </p:cNvSpPr>
+          <p:nvPr>
+            <p:ph type="sldNum" sz="quarter" idx="5"/>
+          </p:nvPr>
+        </p:nvSpPr>
+        <p:spPr/>
+        <p:txBody>
+          <a:bodyPr/>
+          <a:lstStyle/>
+          <a:p>
+            <a:fld id="{2BF067CD-8E6B-4360-9AA8-C5DF2A48A6D1}" type="slidenum">
+              <a:rPr lang="en-US" noProof="0" smtClean="0"/>
+              <a:pPr/>
+              <a:t>11</a:t>
+            </a:fld>
+            <a:endParaRPr lang="en-US" noProof="0" dirty="0"/>
+          </a:p>
+        </p:txBody>
+      </p:sp>
+      <p:sp>
+        <p:nvSpPr>
+          <p:cNvPr id="3" name="Text Placeholder 2">
+            <a:extLst>
+              <a:ext uri="{FF2B5EF4-FFF2-40B4-BE49-F238E27FC236}">
+                <a16:creationId xmlns:a16="http://schemas.microsoft.com/office/drawing/2014/main" id="{9386B5BC-11E7-6EFA-EEE5-92EAB650784E}"/>
+              </a:ext>
+            </a:extLst>
+          </p:cNvPr>
+          <p:cNvSpPr>
+            <a:spLocks noGrp="1"/>
+          </p:cNvSpPr>
+          <p:nvPr>
+            <p:ph type="body" sz="quarter" idx="10"/>
+          </p:nvPr>
+        </p:nvSpPr>
+        <p:spPr/>
+        <p:txBody>
+          <a:bodyPr/>
+          <a:lstStyle/>
+          <a:p>
+            <a:pPr>
+              <a:spcBef>
+                <a:spcPts val="800"/>
+              </a:spcBef>
+            </a:pPr>
+            <a:r>
+              <a:rPr lang="bg-BG" b="1" dirty="0"/>
+              <a:t>Обектно-ориентирано моделиране </a:t>
+            </a:r>
+            <a:r>
+              <a:rPr lang="bg-BG" dirty="0"/>
+              <a:t>(ОО моделиране)</a:t>
+            </a:r>
+          </a:p>
+          <a:p>
+            <a:pPr lvl="1">
+              <a:spcBef>
+                <a:spcPts val="800"/>
+              </a:spcBef>
+            </a:pPr>
+            <a:r>
+              <a:rPr lang="bg-BG" dirty="0"/>
+              <a:t>Моделиране на реалния свят чрез </a:t>
+            </a:r>
+            <a:r>
+              <a:rPr lang="bg-BG" b="1" dirty="0"/>
+              <a:t>класове</a:t>
+            </a:r>
+            <a:r>
+              <a:rPr lang="bg-BG" dirty="0"/>
+              <a:t> и </a:t>
+            </a:r>
+            <a:r>
+              <a:rPr lang="bg-BG" b="1" dirty="0"/>
+              <a:t>взаимовръзки</a:t>
+            </a:r>
+            <a:r>
+              <a:rPr lang="bg-BG" dirty="0"/>
+              <a:t> между тях</a:t>
+            </a:r>
+            <a:r>
+              <a:rPr lang="en-US" dirty="0"/>
+              <a:t> (</a:t>
+            </a:r>
+            <a:r>
+              <a:rPr lang="bg-BG" dirty="0"/>
+              <a:t>наследяване, асоциации, делегиране, …)</a:t>
+            </a:r>
+          </a:p>
+          <a:p>
+            <a:pPr lvl="1">
+              <a:spcBef>
+                <a:spcPts val="800"/>
+              </a:spcBef>
+            </a:pPr>
+            <a:r>
+              <a:rPr lang="bg-BG" b="1" dirty="0"/>
+              <a:t>Наследяване</a:t>
+            </a:r>
+            <a:r>
+              <a:rPr lang="bg-BG" dirty="0"/>
+              <a:t>: </a:t>
+            </a:r>
+            <a:r>
+              <a:rPr lang="en-US" dirty="0"/>
+              <a:t>Rectangle </a:t>
+            </a:r>
+            <a:r>
+              <a:rPr lang="en-US" b="1" i="1" dirty="0"/>
+              <a:t>&lt;is a kind of&gt;</a:t>
+            </a:r>
+            <a:r>
+              <a:rPr lang="en-US" dirty="0"/>
+              <a:t> Figure</a:t>
+            </a:r>
+            <a:endParaRPr lang="en-US" b="1" dirty="0"/>
+          </a:p>
+          <a:p>
+            <a:pPr lvl="1">
+              <a:spcBef>
+                <a:spcPts val="800"/>
+              </a:spcBef>
+            </a:pPr>
+            <a:r>
+              <a:rPr lang="bg-BG" b="1" dirty="0"/>
+              <a:t>Асоциация</a:t>
+            </a:r>
+            <a:r>
+              <a:rPr lang="bg-BG" dirty="0"/>
+              <a:t>: </a:t>
+            </a:r>
+            <a:r>
+              <a:rPr lang="en-US" dirty="0"/>
+              <a:t>Teacher </a:t>
+            </a:r>
+            <a:r>
+              <a:rPr lang="en-US" b="1" i="1" dirty="0"/>
+              <a:t>&lt;works in a&gt;</a:t>
+            </a:r>
+            <a:r>
+              <a:rPr lang="en-US" dirty="0"/>
+              <a:t> School</a:t>
+            </a:r>
+          </a:p>
+          <a:p>
+            <a:pPr lvl="1">
+              <a:spcBef>
+                <a:spcPts val="800"/>
+              </a:spcBef>
+            </a:pPr>
+            <a:r>
+              <a:rPr lang="bg-BG" b="1" dirty="0"/>
+              <a:t>Композиция</a:t>
+            </a:r>
+            <a:r>
+              <a:rPr lang="bg-BG" dirty="0"/>
+              <a:t>: </a:t>
+            </a:r>
+            <a:r>
+              <a:rPr lang="en-US" dirty="0"/>
+              <a:t>Laptop </a:t>
+            </a:r>
+            <a:r>
+              <a:rPr lang="en-US" b="1" i="1" dirty="0"/>
+              <a:t>&lt;has own&gt;</a:t>
+            </a:r>
+            <a:r>
+              <a:rPr lang="en-US" dirty="0"/>
+              <a:t> Keyboard, Screen</a:t>
+            </a:r>
+            <a:endParaRPr lang="bg-BG" dirty="0"/>
+          </a:p>
+          <a:p>
+            <a:pPr lvl="1">
+              <a:spcBef>
+                <a:spcPts val="800"/>
+              </a:spcBef>
+            </a:pPr>
+            <a:r>
+              <a:rPr lang="bg-BG" b="1" dirty="0"/>
+              <a:t>Агрегация</a:t>
+            </a:r>
+            <a:r>
+              <a:rPr lang="bg-BG" dirty="0"/>
+              <a:t>: </a:t>
+            </a:r>
+            <a:r>
+              <a:rPr lang="en-US" dirty="0"/>
+              <a:t>Class </a:t>
+            </a:r>
+            <a:r>
+              <a:rPr lang="en-US" b="1" i="1" dirty="0"/>
+              <a:t>&lt;contains many&gt;</a:t>
+            </a:r>
+            <a:r>
+              <a:rPr lang="en-US" dirty="0"/>
+              <a:t> Student</a:t>
+            </a:r>
+          </a:p>
+          <a:p>
+            <a:pPr lvl="1">
+              <a:spcBef>
+                <a:spcPts val="800"/>
+              </a:spcBef>
+            </a:pPr>
+            <a:r>
+              <a:rPr lang="bg-BG" b="1" dirty="0"/>
+              <a:t>Делегиране</a:t>
+            </a:r>
+            <a:r>
+              <a:rPr lang="bg-BG" dirty="0"/>
+              <a:t>: </a:t>
+            </a:r>
+            <a:r>
+              <a:rPr lang="en-US" dirty="0"/>
+              <a:t>Laptop </a:t>
+            </a:r>
+            <a:r>
+              <a:rPr lang="en-US" b="1" i="1" dirty="0"/>
+              <a:t>&lt;delegates to&gt;</a:t>
+            </a:r>
+            <a:r>
+              <a:rPr lang="en-US" dirty="0"/>
+              <a:t> Screen </a:t>
+            </a:r>
+            <a:r>
+              <a:rPr lang="en-US" b="1" i="1" dirty="0"/>
+              <a:t>&lt;printing&gt;</a:t>
+            </a:r>
+            <a:endParaRPr lang="en-US" dirty="0"/>
+          </a:p>
+        </p:txBody>
+      </p:sp>
+      <p:sp>
+        <p:nvSpPr>
+          <p:cNvPr id="4" name="Title 3">
+            <a:extLst>
+              <a:ext uri="{FF2B5EF4-FFF2-40B4-BE49-F238E27FC236}">
+                <a16:creationId xmlns:a16="http://schemas.microsoft.com/office/drawing/2014/main" id="{4A00F125-D9B6-4265-FA4D-1F380230D5DE}"/>
+              </a:ext>
+            </a:extLst>
+          </p:cNvPr>
+          <p:cNvSpPr>
+            <a:spLocks noGrp="1"/>
+          </p:cNvSpPr>
+          <p:nvPr>
+            <p:ph type="title"/>
+          </p:nvPr>
+        </p:nvSpPr>
+        <p:spPr/>
+        <p:txBody>
+          <a:bodyPr>
+            <a:normAutofit/>
+          </a:bodyPr>
+          <a:lstStyle/>
+          <a:p>
+            <a:r>
+              <a:rPr lang="bg-BG" dirty="0"/>
+              <a:t>Обектно-ориентирано моделиране</a:t>
+            </a:r>
+            <a:endParaRPr lang="en-US" dirty="0"/>
+          </a:p>
+        </p:txBody>
+      </p:sp>
+    </p:spTree>
+    <p:extLst>
+      <p:ext uri="{BB962C8B-B14F-4D97-AF65-F5344CB8AC3E}">
+        <p14:creationId xmlns:p14="http://schemas.microsoft.com/office/powerpoint/2010/main" val="2124713838"/>
+      </p:ext>
+    </p:extLst>
+  </p:cSld>
+  <p:clrMapOvr>
+    <a:masterClrMapping/>
+  </p:clrMapOvr>
+  <mc:AlternateContent xmlns:mc="http://schemas.openxmlformats.org/markup-compatibility/2006" xmlns:p14="http://schemas.microsoft.com/office/powerpoint/2010/main">
+    <mc:Choice Requires="p14">
+      <p:transition spd="slow" p14:dur="2000" advClick="0" advTm="5000"/>
+    </mc:Choice>
+    <mc:Fallback xmlns="">
+      <p:transition spd="slow" advClick="0" advTm="5000"/>
+    </mc:Fallback>
+  </mc:AlternateContent>
+  <p:timing>
+    <p:tnLst>
+      <p:par>
+        <p:cTn id="1" dur="indefinite" restart="never" nodeType="tmRoot">
+          <p:childTnLst>
+            <p:seq concurrent="1" nextAc="seek">
+              <p:cTn id="2" dur="indefinite" nodeType="mainSeq">
+                <p:childTnLst>
+                  <p:par>
+                    <p:cTn id="3" fill="hold">
+                      <p:stCondLst>
+                        <p:cond delay="indefinite"/>
+                      </p:stCondLst>
+                      <p:childTnLst>
+                        <p:par>
+                          <p:cTn id="4" fill="hold">
+                            <p:stCondLst>
+                              <p:cond delay="0"/>
+                            </p:stCondLst>
+                            <p:childTnLst>
+                              <p:par>
+                                <p:cTn id="5" presetID="1" presetClass="entr" presetSubtype="0" fill="hold" nodeType="clickEffect">
+                                  <p:stCondLst>
+                                    <p:cond delay="0"/>
+                                  </p:stCondLst>
+                                  <p:childTnLst>
+                                    <p:set>
+                                      <p:cBhvr>
+                                        <p:cTn id="6" dur="1" fill="hold">
+                                          <p:stCondLst>
+                                            <p:cond delay="0"/>
+                                          </p:stCondLst>
+                                        </p:cTn>
+                                        <p:tgtEl>
+                                          <p:spTgt spid="3">
+                                            <p:txEl>
+                                              <p:pRg st="2" end="2"/>
+                                            </p:txEl>
+                                          </p:spTgt>
+                                        </p:tgtEl>
+                                        <p:attrNameLst>
+                                          <p:attrName>style.visibility</p:attrName>
+                                        </p:attrNameLst>
+                                      </p:cBhvr>
+                                      <p:to>
+                                        <p:strVal val="visible"/>
+                                      </p:to>
+                                    </p:set>
+                                  </p:childTnLst>
+                                </p:cTn>
+                              </p:par>
+                            </p:childTnLst>
+                          </p:cTn>
+                        </p:par>
+                      </p:childTnLst>
+                    </p:cTn>
+                  </p:par>
+                  <p:par>
+                    <p:cTn id="7" fill="hold">
+                      <p:stCondLst>
+                        <p:cond delay="indefinite"/>
+                      </p:stCondLst>
+                      <p:childTnLst>
+                        <p:par>
+                          <p:cTn id="8" fill="hold">
+                            <p:stCondLst>
+                              <p:cond delay="0"/>
+                            </p:stCondLst>
+                            <p:childTnLst>
+                              <p:par>
+                                <p:cTn id="9" presetID="1" presetClass="entr" presetSubtype="0" fill="hold" nodeType="clickEffect">
+                                  <p:stCondLst>
+                                    <p:cond delay="0"/>
+                                  </p:stCondLst>
+                                  <p:childTnLst>
+                                    <p:set>
+                                      <p:cBhvr>
+                                        <p:cTn id="10" dur="1" fill="hold">
+                                          <p:stCondLst>
+                                            <p:cond delay="0"/>
+                                          </p:stCondLst>
+                                        </p:cTn>
+                                        <p:tgtEl>
+                                          <p:spTgt spid="3">
+                                            <p:txEl>
+                                              <p:pRg st="3" end="3"/>
+                                            </p:txEl>
+                                          </p:spTgt>
+                                        </p:tgtEl>
+                                        <p:attrNameLst>
+                                          <p:attrName>style.visibility</p:attrName>
+                                        </p:attrNameLst>
+                                      </p:cBhvr>
+                                      <p:to>
+                                        <p:strVal val="visible"/>
+                                      </p:to>
+                                    </p:set>
+                                  </p:childTnLst>
+                                </p:cTn>
+                              </p:par>
+                            </p:childTnLst>
+                          </p:cTn>
+                        </p:par>
+                      </p:childTnLst>
+                    </p:cTn>
+                  </p:par>
+                  <p:par>
+                    <p:cTn id="11" fill="hold">
+                      <p:stCondLst>
+                        <p:cond delay="indefinite"/>
+                      </p:stCondLst>
+                      <p:childTnLst>
+                        <p:par>
+                          <p:cTn id="12" fill="hold">
+                            <p:stCondLst>
+                              <p:cond delay="0"/>
+                            </p:stCondLst>
+                            <p:childTnLst>
+                              <p:par>
+                                <p:cTn id="13" presetID="1" presetClass="entr" presetSubtype="0" fill="hold" nodeType="clickEffect">
+                                  <p:stCondLst>
+                                    <p:cond delay="0"/>
+                                  </p:stCondLst>
+                                  <p:childTnLst>
+                                    <p:set>
+                                      <p:cBhvr>
+                                        <p:cTn id="14" dur="1" fill="hold">
+                                          <p:stCondLst>
+                                            <p:cond delay="0"/>
+                                          </p:stCondLst>
+                                        </p:cTn>
+                                        <p:tgtEl>
+                                          <p:spTgt spid="3">
+                                            <p:txEl>
+                                              <p:pRg st="4" end="4"/>
+                                            </p:txEl>
+                                          </p:spTgt>
+                                        </p:tgtEl>
+                                        <p:attrNameLst>
+                                          <p:attrName>style.visibility</p:attrName>
+                                        </p:attrNameLst>
+                                      </p:cBhvr>
+                                      <p:to>
+                                        <p:strVal val="visible"/>
+                                      </p:to>
+                                    </p:set>
+                                  </p:childTnLst>
+                                </p:cTn>
+                              </p:par>
+                            </p:childTnLst>
+                          </p:cTn>
+                        </p:par>
+                      </p:childTnLst>
+                    </p:cTn>
+                  </p:par>
+                  <p:par>
+                    <p:cTn id="15" fill="hold">
+                      <p:stCondLst>
+                        <p:cond delay="indefinite"/>
+                      </p:stCondLst>
+                      <p:childTnLst>
+                        <p:par>
+                          <p:cTn id="16" fill="hold">
+                            <p:stCondLst>
+                              <p:cond delay="0"/>
+                            </p:stCondLst>
+                            <p:childTnLst>
+                              <p:par>
+                                <p:cTn id="17" presetID="1" presetClass="entr" presetSubtype="0" fill="hold" nodeType="clickEffect">
+                                  <p:stCondLst>
+                                    <p:cond delay="0"/>
+                                  </p:stCondLst>
+                                  <p:childTnLst>
+                                    <p:set>
+                                      <p:cBhvr>
+                                        <p:cTn id="18" dur="1" fill="hold">
+                                          <p:stCondLst>
+                                            <p:cond delay="0"/>
+                                          </p:stCondLst>
+                                        </p:cTn>
+                                        <p:tgtEl>
+                                          <p:spTgt spid="3">
+                                            <p:txEl>
+                                              <p:pRg st="5" end="5"/>
+                                            </p:txEl>
+                                          </p:spTgt>
+                                        </p:tgtEl>
+                                        <p:attrNameLst>
+                                          <p:attrName>style.visibility</p:attrName>
+                                        </p:attrNameLst>
+                                      </p:cBhvr>
+                                      <p:to>
+                                        <p:strVal val="visible"/>
+                                      </p:to>
+                                    </p:set>
+                                  </p:childTnLst>
+                                </p:cTn>
+                              </p:par>
+                            </p:childTnLst>
+                          </p:cTn>
+                        </p:par>
+                      </p:childTnLst>
+                    </p:cTn>
+                  </p:par>
+                  <p:par>
+                    <p:cTn id="19" fill="hold">
+                      <p:stCondLst>
+                        <p:cond delay="indefinite"/>
+                      </p:stCondLst>
+                      <p:childTnLst>
+                        <p:par>
+                          <p:cTn id="20" fill="hold">
+                            <p:stCondLst>
+                              <p:cond delay="0"/>
+                            </p:stCondLst>
+                            <p:childTnLst>
+                              <p:par>
+                                <p:cTn id="21" presetID="1" presetClass="entr" presetSubtype="0" fill="hold" nodeType="clickEffect">
+                                  <p:stCondLst>
+                                    <p:cond delay="0"/>
+                                  </p:stCondLst>
+                                  <p:childTnLst>
+                                    <p:set>
+                                      <p:cBhvr>
+                                        <p:cTn id="22" dur="1" fill="hold">
+                                          <p:stCondLst>
+                                            <p:cond delay="0"/>
+                                          </p:stCondLst>
+                                        </p:cTn>
+                                        <p:tgtEl>
+                                          <p:spTgt spid="3">
+                                            <p:txEl>
+                                              <p:pRg st="6" end="6"/>
+                                            </p:txEl>
+                                          </p:spTgt>
+                                        </p:tgtEl>
+                                        <p:attrNameLst>
+                                          <p:attrName>style.visibility</p:attrName>
+                                        </p:attrNameLst>
+                                      </p:cBhvr>
+                                      <p:to>
+                                        <p:strVal val="visible"/>
+                                      </p:to>
+                                    </p:set>
+                                  </p:childTnLst>
+                                </p:cTn>
+                              </p:par>
+                            </p:childTnLst>
+                          </p:cTn>
+                        </p:par>
+                      </p:childTnLst>
+                    </p:cTn>
+                  </p:par>
+                </p:childTnLst>
+              </p:cTn>
+              <p:prevCondLst>
+                <p:cond evt="onPrev" delay="0">
+                  <p:tgtEl>
+                    <p:sldTgt/>
+                  </p:tgtEl>
+                </p:cond>
+              </p:prevCondLst>
+              <p:nextCondLst>
+                <p:cond evt="onNext" delay="0">
+                  <p:tgtEl>
+                    <p:sldTgt/>
+                  </p:tgtEl>
+                </p:cond>
+              </p:nextCondLst>
+            </p:seq>
+          </p:childTnLst>
+        </p:cTn>
+      </p:par>
+    </p:tnLst>
+  </p:timing>
+</p:sld>
+</file>
+
+<file path=ppt/slides/slide12.xml><?xml version="1.0" encoding="utf-8"?>
+<p:sld xmlns:a="http://schemas.openxmlformats.org/drawingml/2006/main" xmlns:r="http://schemas.openxmlformats.org/officeDocument/2006/relationships" xmlns:p="http://schemas.openxmlformats.org/presentationml/2006/main">
+  <p:cSld>
+    <p:spTree>
+      <p:nvGrpSpPr>
+        <p:cNvPr id="1" name=""/>
+        <p:cNvGrpSpPr/>
+        <p:nvPr/>
+      </p:nvGrpSpPr>
+      <p:grpSpPr>
+        <a:xfrm>
+          <a:off x="0" y="0"/>
+          <a:ext cx="0" cy="0"/>
+          <a:chOff x="0" y="0"/>
+          <a:chExt cx="0" cy="0"/>
+        </a:xfrm>
+      </p:grpSpPr>
+      <p:sp>
+        <p:nvSpPr>
           <p:cNvPr id="3" name="Content Placeholder 2"/>
           <p:cNvSpPr>
             <a:spLocks noGrp="1"/>
@@ -10535,56 +11301,86 @@
                   <a:schemeClr val="bg1"/>
                 </a:solidFill>
               </a:rPr>
-              <a:t>Повтарянето на код </a:t>
+              <a:t>Асоциация </a:t>
             </a:r>
             <a:r>
               <a:rPr lang="bg-BG" sz="3600" dirty="0"/>
-              <a:t>води до грешки</a:t>
-            </a:r>
-            <a:endParaRPr lang="en-GB" sz="3600" dirty="0"/>
-          </a:p>
-          <a:p>
-            <a:pPr>
+              <a:t>между класове в ООП</a:t>
+            </a:r>
+          </a:p>
+          <a:p>
+            <a:pPr lvl="1">
               <a:buClr>
                 <a:schemeClr val="tx1"/>
               </a:buClr>
             </a:pPr>
             <a:r>
-              <a:rPr lang="bg-BG" sz="3600" b="1" dirty="0">
-                <a:solidFill>
-                  <a:schemeClr val="bg1"/>
-                </a:solidFill>
-              </a:rPr>
-              <a:t>Можем да преизползваме класове </a:t>
-            </a:r>
-            <a:r>
-              <a:rPr lang="bg-BG" sz="3600" dirty="0"/>
-              <a:t>чрез</a:t>
-            </a:r>
-            <a:r>
-              <a:rPr lang="en-GB" sz="3600" dirty="0"/>
-              <a:t> </a:t>
-            </a:r>
-            <a:r>
-              <a:rPr lang="bg-BG" sz="3600" b="1" dirty="0">
-                <a:solidFill>
-                  <a:schemeClr val="bg1"/>
-                </a:solidFill>
-              </a:rPr>
-              <a:t>разширяване</a:t>
-            </a:r>
-            <a:endParaRPr lang="en-GB" sz="3600" b="1" dirty="0">
-              <a:solidFill>
-                <a:schemeClr val="bg1"/>
-              </a:solidFill>
-            </a:endParaRPr>
-          </a:p>
-          <a:p>
-            <a:r>
-              <a:rPr lang="bg-BG" sz="3600" dirty="0"/>
-              <a:t>Понякога това е единственият начин</a:t>
-            </a:r>
-            <a:endParaRPr lang="en-GB" sz="3600" dirty="0"/>
+              <a:rPr lang="bg-BG" sz="3400" dirty="0"/>
+              <a:t>Структурна връзка между два класа:</a:t>
+            </a:r>
+          </a:p>
+          <a:p>
+            <a:pPr lvl="1">
+              <a:buClr>
+                <a:schemeClr val="tx1"/>
+              </a:buClr>
+            </a:pPr>
+            <a:endParaRPr lang="bg-BG" sz="3400" dirty="0"/>
+          </a:p>
+          <a:p>
+            <a:pPr lvl="1">
+              <a:buClr>
+                <a:schemeClr val="tx1"/>
+              </a:buClr>
+            </a:pPr>
+            <a:endParaRPr lang="bg-BG" sz="3400" dirty="0"/>
+          </a:p>
+          <a:p>
+            <a:pPr lvl="1">
+              <a:spcBef>
+                <a:spcPts val="1800"/>
+              </a:spcBef>
+              <a:buClr>
+                <a:schemeClr val="tx1"/>
+              </a:buClr>
+            </a:pPr>
+            <a:r>
+              <a:rPr lang="bg-BG" sz="3400" b="1" dirty="0"/>
+              <a:t>Множественост</a:t>
+            </a:r>
+            <a:r>
+              <a:rPr lang="bg-BG" sz="3400" dirty="0"/>
+              <a:t>: </a:t>
+            </a:r>
+            <a:r>
+              <a:rPr lang="bg-BG" dirty="0"/>
+              <a:t>1-към-1</a:t>
+            </a:r>
+            <a:r>
+              <a:rPr lang="en-US" dirty="0"/>
+              <a:t>, </a:t>
+            </a:r>
+            <a:r>
+              <a:rPr lang="bg-BG" dirty="0"/>
+              <a:t>1-към-много</a:t>
+            </a:r>
+            <a:r>
+              <a:rPr lang="en-US" dirty="0"/>
+              <a:t>, </a:t>
+            </a:r>
+            <a:r>
+              <a:rPr lang="bg-BG" dirty="0"/>
+              <a:t>много-към-1</a:t>
+            </a:r>
+            <a:r>
+              <a:rPr lang="en-US" dirty="0"/>
+              <a:t>, </a:t>
+            </a:r>
+            <a:r>
+              <a:rPr lang="bg-BG" dirty="0"/>
+              <a:t>много-към-много</a:t>
+            </a:r>
+            <a:endParaRPr lang="en-GB" sz="3400" dirty="0"/>
           </a:p>
         </p:txBody>
       </p:sp>
@@ -10606,8 +11402,8 @@
           <a:lstStyle/>
           <a:p>
             <a:r>
-              <a:rPr lang="bg-BG" dirty="0"/>
-              <a:t>Разширяване</a:t>
+              <a:rPr lang="bg-BG" b="1" dirty="0"/>
+              <a:t>Асоциация</a:t>
             </a:r>
             <a:endParaRPr lang="en-US" dirty="0"/>
           </a:p>
@@ -10621,8 +11417,8 @@
         </p:nvSpPr>
         <p:spPr>
           <a:xfrm>
-            <a:off x="3261000" y="3525946"/>
-            <a:ext cx="5195506" cy="1828800"/>
+            <a:off x="1770927" y="2978291"/>
+            <a:ext cx="2305302" cy="901418"/>
           </a:xfrm>
           <a:prstGeom prst="roundRect">
             <a:avLst>
@@ -10659,31 +11455,79 @@
           </a:fontRef>
         </p:style>
         <p:txBody>
-          <a:bodyPr rtlCol="0" anchor="t" anchorCtr="0"/>
+          <a:bodyPr rtlCol="0" anchor="ctr" anchorCtr="0"/>
           <a:lstStyle/>
           <a:p>
             <a:pPr algn="ctr"/>
             <a:r>
-              <a:rPr lang="en-GB" sz="2800" b="1" dirty="0">
+              <a:rPr lang="en-GB" sz="3200" b="1" dirty="0">
                 <a:solidFill>
-                  <a:schemeClr val="bg2"/>
+                  <a:schemeClr val="tx1"/>
                 </a:solidFill>
               </a:rPr>
-              <a:t>Collections</a:t>
+              <a:t>Teacher</a:t>
             </a:r>
           </a:p>
         </p:txBody>
       </p:sp>
       <p:sp>
         <p:nvSpPr>
-          <p:cNvPr id="12" name="Rectangle: Rounded Corners 11"/>
+          <p:cNvPr id="9" name="Slide Number">
+            <a:extLst>
+              <a:ext uri="{FF2B5EF4-FFF2-40B4-BE49-F238E27FC236}">
+                <a16:creationId xmlns:a16="http://schemas.microsoft.com/office/drawing/2014/main" id="{9A2FAB3F-B1CF-49FB-B55F-3E799C2BE4DA}"/>
+              </a:ext>
+            </a:extLst>
+          </p:cNvPr>
+          <p:cNvSpPr>
+            <a:spLocks noGrp="1"/>
+          </p:cNvSpPr>
+          <p:nvPr>
+            <p:ph type="sldNum" sz="quarter" idx="5"/>
+          </p:nvPr>
+        </p:nvSpPr>
+        <p:spPr>
+          <a:xfrm>
+            <a:off x="11753030" y="6507000"/>
+            <a:ext cx="367414" cy="297000"/>
+          </a:xfrm>
+          <a:prstGeom prst="rect">
+            <a:avLst/>
+          </a:prstGeom>
+        </p:spPr>
+        <p:txBody>
+          <a:bodyPr vert="horz" lIns="91440" tIns="45720" rIns="91440" bIns="45720" rtlCol="0" anchor="b"/>
+          <a:lstStyle>
+            <a:lvl1pPr algn="r">
+              <a:defRPr sz="1000"/>
+            </a:lvl1pPr>
+          </a:lstStyle>
+          <a:p>
+            <a:fld id="{2BF067CD-8E6B-4360-9AA8-C5DF2A48A6D1}" type="slidenum">
+              <a:rPr lang="en-US" noProof="0" smtClean="0"/>
+              <a:pPr/>
+              <a:t>12</a:t>
+            </a:fld>
+            <a:endParaRPr lang="en-US" noProof="0" dirty="0"/>
+          </a:p>
+        </p:txBody>
+      </p:sp>
+      <p:sp>
+        <p:nvSpPr>
+          <p:cNvPr id="2" name="Rectangle: Rounded Corners 1">
+            <a:extLst>
+              <a:ext uri="{FF2B5EF4-FFF2-40B4-BE49-F238E27FC236}">
+                <a16:creationId xmlns:a16="http://schemas.microsoft.com/office/drawing/2014/main" id="{C1B95C7B-3B09-44C6-1B29-85FB5E8C3181}"/>
+              </a:ext>
+            </a:extLst>
+          </p:cNvPr>
           <p:cNvSpPr/>
           <p:nvPr/>
         </p:nvSpPr>
         <p:spPr>
           <a:xfrm>
-            <a:off x="3503709" y="4388245"/>
-            <a:ext cx="4710089" cy="585500"/>
+            <a:off x="7576078" y="2978291"/>
+            <a:ext cx="2174598" cy="901418"/>
           </a:xfrm>
           <a:prstGeom prst="roundRect">
             <a:avLst>
@@ -10720,60 +11564,159 @@
           </a:fontRef>
         </p:style>
         <p:txBody>
-          <a:bodyPr rtlCol="0" anchor="t" anchorCtr="0"/>
+          <a:bodyPr rtlCol="0" anchor="ctr" anchorCtr="0"/>
           <a:lstStyle/>
           <a:p>
             <a:pPr algn="ctr"/>
             <a:r>
-              <a:rPr lang="en-GB" sz="2800" b="1" noProof="1">
+              <a:rPr lang="en-GB" sz="3200" b="1" noProof="1">
                 <a:solidFill>
-                  <a:schemeClr val="bg2"/>
+                  <a:schemeClr val="tx1"/>
                 </a:solidFill>
               </a:rPr>
-              <a:t>List</a:t>
-            </a:r>
-            <a:r>
-              <a:rPr lang="bg-BG" sz="2800" b="1" noProof="1">
-                <a:solidFill>
-                  <a:schemeClr val="bg2"/>
-                </a:solidFill>
-              </a:rPr>
-              <a:t>&lt;</a:t>
-            </a:r>
-            <a:r>
-              <a:rPr lang="af-ZA" sz="2800" b="1" noProof="1">
-                <a:solidFill>
-                  <a:schemeClr val="bg2"/>
-                </a:solidFill>
-              </a:rPr>
-              <a:t>string</a:t>
-            </a:r>
-            <a:r>
-              <a:rPr lang="bg-BG" sz="2800" b="1" noProof="1">
-                <a:solidFill>
-                  <a:schemeClr val="bg2"/>
-                </a:solidFill>
-              </a:rPr>
-              <a:t>&gt;</a:t>
-            </a:r>
-            <a:endParaRPr lang="en-GB" sz="2800" b="1" noProof="1">
+              <a:t>School</a:t>
+            </a:r>
+          </a:p>
+        </p:txBody>
+      </p:sp>
+      <p:grpSp>
+        <p:nvGrpSpPr>
+          <p:cNvPr id="14" name="Group 13">
+            <a:extLst>
+              <a:ext uri="{FF2B5EF4-FFF2-40B4-BE49-F238E27FC236}">
+                <a16:creationId xmlns:a16="http://schemas.microsoft.com/office/drawing/2014/main" id="{93F9670C-5A01-AC8E-8314-F058543DFBDF}"/>
+              </a:ext>
+            </a:extLst>
+          </p:cNvPr>
+          <p:cNvGrpSpPr/>
+          <p:nvPr/>
+        </p:nvGrpSpPr>
+        <p:grpSpPr>
+          <a:xfrm>
+            <a:off x="4558165" y="2844000"/>
+            <a:ext cx="2535976" cy="682803"/>
+            <a:chOff x="4642571" y="2889000"/>
+            <a:chExt cx="2535976" cy="682803"/>
+          </a:xfrm>
+        </p:grpSpPr>
+        <p:cxnSp>
+          <p:nvCxnSpPr>
+            <p:cNvPr id="7" name="Straight Arrow Connector 6">
+              <a:extLst>
+                <a:ext uri="{FF2B5EF4-FFF2-40B4-BE49-F238E27FC236}">
+                  <a16:creationId xmlns:a16="http://schemas.microsoft.com/office/drawing/2014/main" id="{42ECF772-48C1-B84A-2757-D4944C22540A}"/>
+                </a:ext>
+              </a:extLst>
+            </p:cNvPr>
+            <p:cNvCxnSpPr/>
+            <p:nvPr/>
+          </p:nvCxnSpPr>
+          <p:spPr>
+            <a:xfrm>
+              <a:off x="4642571" y="3571803"/>
+              <a:ext cx="2535976" cy="0"/>
+            </a:xfrm>
+            <a:prstGeom prst="straightConnector1">
+              <a:avLst/>
+            </a:prstGeom>
+            <a:ln w="76200">
               <a:solidFill>
-                <a:schemeClr val="bg2"/>
+                <a:schemeClr val="tx1"/>
               </a:solidFill>
-            </a:endParaRPr>
-          </a:p>
-        </p:txBody>
-      </p:sp>
-      <p:sp>
-        <p:nvSpPr>
-          <p:cNvPr id="13" name="Rectangle: Rounded Corners 12"/>
+              <a:tailEnd type="triangle"/>
+            </a:ln>
+          </p:spPr>
+          <p:style>
+            <a:lnRef idx="1">
+              <a:schemeClr val="accent1"/>
+            </a:lnRef>
+            <a:fillRef idx="0">
+              <a:schemeClr val="accent1"/>
+            </a:fillRef>
+            <a:effectRef idx="0">
+              <a:schemeClr val="accent1"/>
+            </a:effectRef>
+            <a:fontRef idx="minor">
+              <a:schemeClr val="tx1"/>
+            </a:fontRef>
+          </p:style>
+        </p:cxnSp>
+        <p:sp>
+          <p:nvSpPr>
+            <p:cNvPr id="8" name="TextBox 7">
+              <a:extLst>
+                <a:ext uri="{FF2B5EF4-FFF2-40B4-BE49-F238E27FC236}">
+                  <a16:creationId xmlns:a16="http://schemas.microsoft.com/office/drawing/2014/main" id="{C94621A9-4720-413F-24B7-DCD70EC7FE95}"/>
+                </a:ext>
+              </a:extLst>
+            </p:cNvPr>
+            <p:cNvSpPr txBox="1"/>
+            <p:nvPr/>
+          </p:nvSpPr>
+          <p:spPr>
+            <a:xfrm>
+              <a:off x="4791000" y="2889000"/>
+              <a:ext cx="2174598" cy="668361"/>
+            </a:xfrm>
+            <a:prstGeom prst="rect">
+              <a:avLst/>
+            </a:prstGeom>
+            <a:noFill/>
+            <a:ln w="12700">
+              <a:noFill/>
+            </a:ln>
+          </p:spPr>
+          <p:txBody>
+            <a:bodyPr vert="horz" wrap="none" lIns="144000" tIns="108000" rIns="144000" bIns="108000" rtlCol="0">
+              <a:spAutoFit/>
+            </a:bodyPr>
+            <a:lstStyle/>
+            <a:p>
+              <a:pPr algn="l" eaLnBrk="0" hangingPunct="0">
+                <a:lnSpc>
+                  <a:spcPct val="110000"/>
+                </a:lnSpc>
+                <a:buClr>
+                  <a:schemeClr val="accent5">
+                    <a:lumMod val="40000"/>
+                    <a:lumOff val="60000"/>
+                  </a:schemeClr>
+                </a:buClr>
+                <a:buSzPct val="70000"/>
+              </a:pPr>
+              <a:r>
+                <a:rPr lang="bg-BG" sz="2800" b="1" i="1" dirty="0"/>
+                <a:t>&lt;</a:t>
+              </a:r>
+              <a:r>
+                <a:rPr lang="en-US" sz="2800" b="1" i="1" dirty="0"/>
+                <a:t>works in a</a:t>
+              </a:r>
+              <a:r>
+                <a:rPr lang="bg-BG" sz="2800" b="1" i="1" dirty="0"/>
+                <a:t>&gt;</a:t>
+              </a:r>
+              <a:endParaRPr lang="en-US" sz="2800" b="1" i="1" dirty="0"/>
+            </a:p>
+          </p:txBody>
+        </p:sp>
+      </p:grpSp>
+      <p:sp>
+        <p:nvSpPr>
+          <p:cNvPr id="16" name="Rectangle: Rounded Corners 15">
+            <a:extLst>
+              <a:ext uri="{FF2B5EF4-FFF2-40B4-BE49-F238E27FC236}">
+                <a16:creationId xmlns:a16="http://schemas.microsoft.com/office/drawing/2014/main" id="{870150E4-26A9-C3FF-304B-135E1EB0FDB9}"/>
+              </a:ext>
+            </a:extLst>
+          </p:cNvPr>
           <p:cNvSpPr/>
           <p:nvPr/>
         </p:nvSpPr>
         <p:spPr>
           <a:xfrm>
-            <a:off x="2970107" y="5759846"/>
-            <a:ext cx="5777698" cy="585500"/>
+            <a:off x="1770927" y="5499000"/>
+            <a:ext cx="2305302" cy="901418"/>
           </a:xfrm>
           <a:prstGeom prst="roundRect">
             <a:avLst>
@@ -10810,17 +11753,880 @@
           </a:fontRef>
         </p:style>
         <p:txBody>
-          <a:bodyPr rtlCol="0" anchor="t" anchorCtr="0"/>
+          <a:bodyPr rtlCol="0" anchor="ctr" anchorCtr="0"/>
+          <a:lstStyle/>
+          <a:p>
+            <a:pPr algn="ctr"/>
+            <a:r>
+              <a:rPr lang="en-US" sz="3200" b="1" dirty="0">
+                <a:solidFill>
+                  <a:schemeClr val="tx1"/>
+                </a:solidFill>
+              </a:rPr>
+              <a:t>School</a:t>
+            </a:r>
+            <a:endParaRPr lang="en-GB" sz="3200" b="1" dirty="0">
+              <a:solidFill>
+                <a:schemeClr val="tx1"/>
+              </a:solidFill>
+            </a:endParaRPr>
+          </a:p>
+        </p:txBody>
+      </p:sp>
+      <p:sp>
+        <p:nvSpPr>
+          <p:cNvPr id="17" name="Rectangle: Rounded Corners 16">
+            <a:extLst>
+              <a:ext uri="{FF2B5EF4-FFF2-40B4-BE49-F238E27FC236}">
+                <a16:creationId xmlns:a16="http://schemas.microsoft.com/office/drawing/2014/main" id="{7500E25D-6043-C0FA-4F2C-657281A7C250}"/>
+              </a:ext>
+            </a:extLst>
+          </p:cNvPr>
+          <p:cNvSpPr/>
+          <p:nvPr/>
+        </p:nvSpPr>
+        <p:spPr>
+          <a:xfrm>
+            <a:off x="7576078" y="5499000"/>
+            <a:ext cx="2174598" cy="901418"/>
+          </a:xfrm>
+          <a:prstGeom prst="roundRect">
+            <a:avLst>
+              <a:gd name="adj" fmla="val 5385"/>
+            </a:avLst>
+          </a:prstGeom>
+          <a:solidFill>
+            <a:schemeClr val="tx1">
+              <a:lumMod val="75000"/>
+              <a:alpha val="30000"/>
+            </a:schemeClr>
+          </a:solidFill>
+          <a:ln w="57150">
+            <a:solidFill>
+              <a:schemeClr val="tx1"/>
+            </a:solidFill>
+            <a:prstDash val="sysDash"/>
+          </a:ln>
+        </p:spPr>
+        <p:style>
+          <a:lnRef idx="2">
+            <a:schemeClr val="accent1">
+              <a:shade val="50000"/>
+            </a:schemeClr>
+          </a:lnRef>
+          <a:fillRef idx="1">
+            <a:schemeClr val="accent1"/>
+          </a:fillRef>
+          <a:effectRef idx="0">
+            <a:schemeClr val="accent1"/>
+          </a:effectRef>
+          <a:fontRef idx="minor">
+            <a:schemeClr val="lt1"/>
+          </a:fontRef>
+        </p:style>
+        <p:txBody>
+          <a:bodyPr rtlCol="0" anchor="ctr" anchorCtr="0"/>
+          <a:lstStyle/>
+          <a:p>
+            <a:pPr algn="ctr"/>
+            <a:r>
+              <a:rPr lang="en-GB" sz="3200" b="1" noProof="1">
+                <a:solidFill>
+                  <a:schemeClr val="tx1"/>
+                </a:solidFill>
+              </a:rPr>
+              <a:t>Student</a:t>
+            </a:r>
+          </a:p>
+        </p:txBody>
+      </p:sp>
+      <p:grpSp>
+        <p:nvGrpSpPr>
+          <p:cNvPr id="23" name="Group 22">
+            <a:extLst>
+              <a:ext uri="{FF2B5EF4-FFF2-40B4-BE49-F238E27FC236}">
+                <a16:creationId xmlns:a16="http://schemas.microsoft.com/office/drawing/2014/main" id="{74F938F6-9912-F32E-18BB-697480980F32}"/>
+              </a:ext>
+            </a:extLst>
+          </p:cNvPr>
+          <p:cNvGrpSpPr/>
+          <p:nvPr/>
+        </p:nvGrpSpPr>
+        <p:grpSpPr>
+          <a:xfrm>
+            <a:off x="4452445" y="5370639"/>
+            <a:ext cx="2743904" cy="1265726"/>
+            <a:chOff x="4452445" y="5370639"/>
+            <a:chExt cx="2743904" cy="1265726"/>
+          </a:xfrm>
+        </p:grpSpPr>
+        <p:cxnSp>
+          <p:nvCxnSpPr>
+            <p:cNvPr id="19" name="Straight Arrow Connector 18">
+              <a:extLst>
+                <a:ext uri="{FF2B5EF4-FFF2-40B4-BE49-F238E27FC236}">
+                  <a16:creationId xmlns:a16="http://schemas.microsoft.com/office/drawing/2014/main" id="{D1B87FC4-288B-9687-2A94-1FFD1BADBA47}"/>
+                </a:ext>
+              </a:extLst>
+            </p:cNvPr>
+            <p:cNvCxnSpPr/>
+            <p:nvPr/>
+          </p:nvCxnSpPr>
+          <p:spPr>
+            <a:xfrm>
+              <a:off x="4558165" y="6047512"/>
+              <a:ext cx="2535976" cy="0"/>
+            </a:xfrm>
+            <a:prstGeom prst="straightConnector1">
+              <a:avLst/>
+            </a:prstGeom>
+            <a:ln w="76200">
+              <a:solidFill>
+                <a:schemeClr val="tx1"/>
+              </a:solidFill>
+              <a:tailEnd type="triangle"/>
+            </a:ln>
+          </p:spPr>
+          <p:style>
+            <a:lnRef idx="1">
+              <a:schemeClr val="accent1"/>
+            </a:lnRef>
+            <a:fillRef idx="0">
+              <a:schemeClr val="accent1"/>
+            </a:fillRef>
+            <a:effectRef idx="0">
+              <a:schemeClr val="accent1"/>
+            </a:effectRef>
+            <a:fontRef idx="minor">
+              <a:schemeClr val="tx1"/>
+            </a:fontRef>
+          </p:style>
+        </p:cxnSp>
+        <p:sp>
+          <p:nvSpPr>
+            <p:cNvPr id="20" name="TextBox 19">
+              <a:extLst>
+                <a:ext uri="{FF2B5EF4-FFF2-40B4-BE49-F238E27FC236}">
+                  <a16:creationId xmlns:a16="http://schemas.microsoft.com/office/drawing/2014/main" id="{22E5E3D5-951D-5826-0F13-3269A2E522D1}"/>
+                </a:ext>
+              </a:extLst>
+            </p:cNvPr>
+            <p:cNvSpPr txBox="1"/>
+            <p:nvPr/>
+          </p:nvSpPr>
+          <p:spPr>
+            <a:xfrm>
+              <a:off x="4791000" y="5370639"/>
+              <a:ext cx="2080533" cy="668361"/>
+            </a:xfrm>
+            <a:prstGeom prst="rect">
+              <a:avLst/>
+            </a:prstGeom>
+            <a:noFill/>
+            <a:ln w="12700">
+              <a:noFill/>
+            </a:ln>
+          </p:spPr>
+          <p:txBody>
+            <a:bodyPr vert="horz" wrap="none" lIns="144000" tIns="108000" rIns="144000" bIns="108000" rtlCol="0">
+              <a:spAutoFit/>
+            </a:bodyPr>
+            <a:lstStyle/>
+            <a:p>
+              <a:pPr algn="l" eaLnBrk="0" hangingPunct="0">
+                <a:lnSpc>
+                  <a:spcPct val="110000"/>
+                </a:lnSpc>
+                <a:buClr>
+                  <a:schemeClr val="accent5">
+                    <a:lumMod val="40000"/>
+                    <a:lumOff val="60000"/>
+                  </a:schemeClr>
+                </a:buClr>
+                <a:buSzPct val="70000"/>
+              </a:pPr>
+              <a:r>
+                <a:rPr lang="en-US" sz="2800" b="1" i="1" dirty="0"/>
+                <a:t>&lt;has many&gt;</a:t>
+              </a:r>
+            </a:p>
+          </p:txBody>
+        </p:sp>
+        <p:sp>
+          <p:nvSpPr>
+            <p:cNvPr id="21" name="TextBox 20">
+              <a:extLst>
+                <a:ext uri="{FF2B5EF4-FFF2-40B4-BE49-F238E27FC236}">
+                  <a16:creationId xmlns:a16="http://schemas.microsoft.com/office/drawing/2014/main" id="{B745C446-5CC7-9BC4-576C-593DD16E68D5}"/>
+                </a:ext>
+              </a:extLst>
+            </p:cNvPr>
+            <p:cNvSpPr txBox="1"/>
+            <p:nvPr/>
+          </p:nvSpPr>
+          <p:spPr>
+            <a:xfrm>
+              <a:off x="4452445" y="5984869"/>
+              <a:ext cx="473555" cy="607601"/>
+            </a:xfrm>
+            <a:prstGeom prst="rect">
+              <a:avLst/>
+            </a:prstGeom>
+            <a:noFill/>
+            <a:ln w="12700">
+              <a:noFill/>
+            </a:ln>
+          </p:spPr>
+          <p:txBody>
+            <a:bodyPr vert="horz" wrap="none" lIns="144000" tIns="108000" rIns="144000" bIns="108000" rtlCol="0">
+              <a:spAutoFit/>
+            </a:bodyPr>
+            <a:lstStyle/>
+            <a:p>
+              <a:pPr algn="l" eaLnBrk="0" hangingPunct="0">
+                <a:lnSpc>
+                  <a:spcPct val="110000"/>
+                </a:lnSpc>
+                <a:buClr>
+                  <a:schemeClr val="accent5">
+                    <a:lumMod val="40000"/>
+                    <a:lumOff val="60000"/>
+                  </a:schemeClr>
+                </a:buClr>
+                <a:buSzPct val="70000"/>
+              </a:pPr>
+              <a:r>
+                <a:rPr lang="en-US" sz="2800" b="1" dirty="0"/>
+                <a:t>1</a:t>
+              </a:r>
+            </a:p>
+          </p:txBody>
+        </p:sp>
+        <p:sp>
+          <p:nvSpPr>
+            <p:cNvPr id="22" name="TextBox 21">
+              <a:extLst>
+                <a:ext uri="{FF2B5EF4-FFF2-40B4-BE49-F238E27FC236}">
+                  <a16:creationId xmlns:a16="http://schemas.microsoft.com/office/drawing/2014/main" id="{B40D64C9-7FC4-4826-78F3-34BA117A40DB}"/>
+                </a:ext>
+              </a:extLst>
+            </p:cNvPr>
+            <p:cNvSpPr txBox="1"/>
+            <p:nvPr/>
+          </p:nvSpPr>
+          <p:spPr>
+            <a:xfrm>
+              <a:off x="6726000" y="6084000"/>
+              <a:ext cx="470349" cy="552365"/>
+            </a:xfrm>
+            <a:prstGeom prst="rect">
+              <a:avLst/>
+            </a:prstGeom>
+            <a:noFill/>
+            <a:ln w="12700">
+              <a:noFill/>
+            </a:ln>
+          </p:spPr>
+          <p:txBody>
+            <a:bodyPr vert="horz" wrap="none" lIns="144000" tIns="108000" rIns="144000" bIns="108000" rtlCol="0">
+              <a:spAutoFit/>
+            </a:bodyPr>
+            <a:lstStyle/>
+            <a:p>
+              <a:pPr algn="l" eaLnBrk="0" hangingPunct="0">
+                <a:lnSpc>
+                  <a:spcPct val="110000"/>
+                </a:lnSpc>
+                <a:buClr>
+                  <a:schemeClr val="accent5">
+                    <a:lumMod val="40000"/>
+                    <a:lumOff val="60000"/>
+                  </a:schemeClr>
+                </a:buClr>
+                <a:buSzPct val="70000"/>
+              </a:pPr>
+              <a:r>
+                <a:rPr lang="en-US" sz="2800" b="1" dirty="0"/>
+                <a:t>*</a:t>
+              </a:r>
+            </a:p>
+          </p:txBody>
+        </p:sp>
+      </p:grpSp>
+    </p:spTree>
+    <p:extLst>
+      <p:ext uri="{BB962C8B-B14F-4D97-AF65-F5344CB8AC3E}">
+        <p14:creationId xmlns:p14="http://schemas.microsoft.com/office/powerpoint/2010/main" val="3575903106"/>
+      </p:ext>
+    </p:extLst>
+  </p:cSld>
+  <p:clrMapOvr>
+    <a:masterClrMapping/>
+  </p:clrMapOvr>
+  <mc:AlternateContent xmlns:mc="http://schemas.openxmlformats.org/markup-compatibility/2006">
+    <mc:Choice xmlns:p14="http://schemas.microsoft.com/office/powerpoint/2010/main" Requires="p14">
+      <p:transition p14:dur="10" advClick="0" advTm="5000"/>
+    </mc:Choice>
+    <mc:Fallback>
+      <p:transition advClick="0" advTm="5000"/>
+    </mc:Fallback>
+  </mc:AlternateContent>
+  <p:timing>
+    <p:tnLst>
+      <p:par>
+        <p:cTn id="1" dur="indefinite" restart="never" nodeType="tmRoot">
+          <p:childTnLst>
+            <p:seq concurrent="1" nextAc="seek">
+              <p:cTn id="2" dur="indefinite" nodeType="mainSeq">
+                <p:childTnLst>
+                  <p:par>
+                    <p:cTn id="3" fill="hold">
+                      <p:stCondLst>
+                        <p:cond delay="indefinite"/>
+                      </p:stCondLst>
+                      <p:childTnLst>
+                        <p:par>
+                          <p:cTn id="4" fill="hold">
+                            <p:stCondLst>
+                              <p:cond delay="0"/>
+                            </p:stCondLst>
+                            <p:childTnLst>
+                              <p:par>
+                                <p:cTn id="5" presetID="1" presetClass="entr" presetSubtype="0" fill="hold" grpId="0" nodeType="clickEffect">
+                                  <p:stCondLst>
+                                    <p:cond delay="0"/>
+                                  </p:stCondLst>
+                                  <p:childTnLst>
+                                    <p:set>
+                                      <p:cBhvr>
+                                        <p:cTn id="6" dur="1" fill="hold">
+                                          <p:stCondLst>
+                                            <p:cond delay="0"/>
+                                          </p:stCondLst>
+                                        </p:cTn>
+                                        <p:tgtEl>
+                                          <p:spTgt spid="11"/>
+                                        </p:tgtEl>
+                                        <p:attrNameLst>
+                                          <p:attrName>style.visibility</p:attrName>
+                                        </p:attrNameLst>
+                                      </p:cBhvr>
+                                      <p:to>
+                                        <p:strVal val="visible"/>
+                                      </p:to>
+                                    </p:set>
+                                  </p:childTnLst>
+                                </p:cTn>
+                              </p:par>
+                              <p:par>
+                                <p:cTn id="7" presetID="1" presetClass="entr" presetSubtype="0" fill="hold" grpId="0" nodeType="withEffect">
+                                  <p:stCondLst>
+                                    <p:cond delay="0"/>
+                                  </p:stCondLst>
+                                  <p:childTnLst>
+                                    <p:set>
+                                      <p:cBhvr>
+                                        <p:cTn id="8" dur="1" fill="hold">
+                                          <p:stCondLst>
+                                            <p:cond delay="0"/>
+                                          </p:stCondLst>
+                                        </p:cTn>
+                                        <p:tgtEl>
+                                          <p:spTgt spid="2"/>
+                                        </p:tgtEl>
+                                        <p:attrNameLst>
+                                          <p:attrName>style.visibility</p:attrName>
+                                        </p:attrNameLst>
+                                      </p:cBhvr>
+                                      <p:to>
+                                        <p:strVal val="visible"/>
+                                      </p:to>
+                                    </p:set>
+                                  </p:childTnLst>
+                                </p:cTn>
+                              </p:par>
+                              <p:par>
+                                <p:cTn id="9" presetID="1" presetClass="entr" presetSubtype="0" fill="hold" nodeType="withEffect">
+                                  <p:stCondLst>
+                                    <p:cond delay="0"/>
+                                  </p:stCondLst>
+                                  <p:childTnLst>
+                                    <p:set>
+                                      <p:cBhvr>
+                                        <p:cTn id="10" dur="1" fill="hold">
+                                          <p:stCondLst>
+                                            <p:cond delay="0"/>
+                                          </p:stCondLst>
+                                        </p:cTn>
+                                        <p:tgtEl>
+                                          <p:spTgt spid="14"/>
+                                        </p:tgtEl>
+                                        <p:attrNameLst>
+                                          <p:attrName>style.visibility</p:attrName>
+                                        </p:attrNameLst>
+                                      </p:cBhvr>
+                                      <p:to>
+                                        <p:strVal val="visible"/>
+                                      </p:to>
+                                    </p:set>
+                                  </p:childTnLst>
+                                </p:cTn>
+                              </p:par>
+                            </p:childTnLst>
+                          </p:cTn>
+                        </p:par>
+                      </p:childTnLst>
+                    </p:cTn>
+                  </p:par>
+                  <p:par>
+                    <p:cTn id="11" fill="hold">
+                      <p:stCondLst>
+                        <p:cond delay="indefinite"/>
+                      </p:stCondLst>
+                      <p:childTnLst>
+                        <p:par>
+                          <p:cTn id="12" fill="hold">
+                            <p:stCondLst>
+                              <p:cond delay="0"/>
+                            </p:stCondLst>
+                            <p:childTnLst>
+                              <p:par>
+                                <p:cTn id="13" presetID="1" presetClass="entr" presetSubtype="0" fill="hold" nodeType="clickEffect">
+                                  <p:stCondLst>
+                                    <p:cond delay="0"/>
+                                  </p:stCondLst>
+                                  <p:childTnLst>
+                                    <p:set>
+                                      <p:cBhvr>
+                                        <p:cTn id="14" dur="1" fill="hold">
+                                          <p:stCondLst>
+                                            <p:cond delay="0"/>
+                                          </p:stCondLst>
+                                        </p:cTn>
+                                        <p:tgtEl>
+                                          <p:spTgt spid="3">
+                                            <p:txEl>
+                                              <p:pRg st="4" end="4"/>
+                                            </p:txEl>
+                                          </p:spTgt>
+                                        </p:tgtEl>
+                                        <p:attrNameLst>
+                                          <p:attrName>style.visibility</p:attrName>
+                                        </p:attrNameLst>
+                                      </p:cBhvr>
+                                      <p:to>
+                                        <p:strVal val="visible"/>
+                                      </p:to>
+                                    </p:set>
+                                  </p:childTnLst>
+                                </p:cTn>
+                              </p:par>
+                            </p:childTnLst>
+                          </p:cTn>
+                        </p:par>
+                      </p:childTnLst>
+                    </p:cTn>
+                  </p:par>
+                  <p:par>
+                    <p:cTn id="15" fill="hold">
+                      <p:stCondLst>
+                        <p:cond delay="indefinite"/>
+                      </p:stCondLst>
+                      <p:childTnLst>
+                        <p:par>
+                          <p:cTn id="16" fill="hold">
+                            <p:stCondLst>
+                              <p:cond delay="0"/>
+                            </p:stCondLst>
+                            <p:childTnLst>
+                              <p:par>
+                                <p:cTn id="17" presetID="1" presetClass="entr" presetSubtype="0" fill="hold" grpId="0" nodeType="clickEffect">
+                                  <p:stCondLst>
+                                    <p:cond delay="0"/>
+                                  </p:stCondLst>
+                                  <p:childTnLst>
+                                    <p:set>
+                                      <p:cBhvr>
+                                        <p:cTn id="18" dur="1" fill="hold">
+                                          <p:stCondLst>
+                                            <p:cond delay="0"/>
+                                          </p:stCondLst>
+                                        </p:cTn>
+                                        <p:tgtEl>
+                                          <p:spTgt spid="16"/>
+                                        </p:tgtEl>
+                                        <p:attrNameLst>
+                                          <p:attrName>style.visibility</p:attrName>
+                                        </p:attrNameLst>
+                                      </p:cBhvr>
+                                      <p:to>
+                                        <p:strVal val="visible"/>
+                                      </p:to>
+                                    </p:set>
+                                  </p:childTnLst>
+                                </p:cTn>
+                              </p:par>
+                              <p:par>
+                                <p:cTn id="19" presetID="1" presetClass="entr" presetSubtype="0" fill="hold" grpId="0" nodeType="withEffect">
+                                  <p:stCondLst>
+                                    <p:cond delay="0"/>
+                                  </p:stCondLst>
+                                  <p:childTnLst>
+                                    <p:set>
+                                      <p:cBhvr>
+                                        <p:cTn id="20" dur="1" fill="hold">
+                                          <p:stCondLst>
+                                            <p:cond delay="0"/>
+                                          </p:stCondLst>
+                                        </p:cTn>
+                                        <p:tgtEl>
+                                          <p:spTgt spid="17"/>
+                                        </p:tgtEl>
+                                        <p:attrNameLst>
+                                          <p:attrName>style.visibility</p:attrName>
+                                        </p:attrNameLst>
+                                      </p:cBhvr>
+                                      <p:to>
+                                        <p:strVal val="visible"/>
+                                      </p:to>
+                                    </p:set>
+                                  </p:childTnLst>
+                                </p:cTn>
+                              </p:par>
+                              <p:par>
+                                <p:cTn id="21" presetID="1" presetClass="entr" presetSubtype="0" fill="hold" nodeType="withEffect">
+                                  <p:stCondLst>
+                                    <p:cond delay="0"/>
+                                  </p:stCondLst>
+                                  <p:childTnLst>
+                                    <p:set>
+                                      <p:cBhvr>
+                                        <p:cTn id="22" dur="1" fill="hold">
+                                          <p:stCondLst>
+                                            <p:cond delay="0"/>
+                                          </p:stCondLst>
+                                        </p:cTn>
+                                        <p:tgtEl>
+                                          <p:spTgt spid="23"/>
+                                        </p:tgtEl>
+                                        <p:attrNameLst>
+                                          <p:attrName>style.visibility</p:attrName>
+                                        </p:attrNameLst>
+                                      </p:cBhvr>
+                                      <p:to>
+                                        <p:strVal val="visible"/>
+                                      </p:to>
+                                    </p:set>
+                                  </p:childTnLst>
+                                </p:cTn>
+                              </p:par>
+                            </p:childTnLst>
+                          </p:cTn>
+                        </p:par>
+                      </p:childTnLst>
+                    </p:cTn>
+                  </p:par>
+                </p:childTnLst>
+              </p:cTn>
+              <p:prevCondLst>
+                <p:cond evt="onPrev" delay="0">
+                  <p:tgtEl>
+                    <p:sldTgt/>
+                  </p:tgtEl>
+                </p:cond>
+              </p:prevCondLst>
+              <p:nextCondLst>
+                <p:cond evt="onNext" delay="0">
+                  <p:tgtEl>
+                    <p:sldTgt/>
+                  </p:tgtEl>
+                </p:cond>
+              </p:nextCondLst>
+            </p:seq>
+          </p:childTnLst>
+        </p:cTn>
+      </p:par>
+    </p:tnLst>
+    <p:bldLst>
+      <p:bldP spid="11" grpId="0" animBg="1"/>
+      <p:bldP spid="2" grpId="0" animBg="1"/>
+      <p:bldP spid="16" grpId="0" animBg="1"/>
+      <p:bldP spid="17" grpId="0" animBg="1"/>
+    </p:bldLst>
+  </p:timing>
+</p:sld>
+</file>
+
+<file path=ppt/slides/slide13.xml><?xml version="1.0" encoding="utf-8"?>
+<p:sld xmlns:a="http://schemas.openxmlformats.org/drawingml/2006/main" xmlns:r="http://schemas.openxmlformats.org/officeDocument/2006/relationships" xmlns:p="http://schemas.openxmlformats.org/presentationml/2006/main">
+  <p:cSld>
+    <p:spTree>
+      <p:nvGrpSpPr>
+        <p:cNvPr id="1" name=""/>
+        <p:cNvGrpSpPr/>
+        <p:nvPr/>
+      </p:nvGrpSpPr>
+      <p:grpSpPr>
+        <a:xfrm>
+          <a:off x="0" y="0"/>
+          <a:ext cx="0" cy="0"/>
+          <a:chOff x="0" y="0"/>
+          <a:chExt cx="0" cy="0"/>
+        </a:xfrm>
+      </p:grpSpPr>
+      <p:sp>
+        <p:nvSpPr>
+          <p:cNvPr id="3" name="Content Placeholder 2"/>
+          <p:cNvSpPr>
+            <a:spLocks noGrp="1"/>
+          </p:cNvSpPr>
+          <p:nvPr>
+            <p:ph type="body" sz="quarter" idx="10"/>
+          </p:nvPr>
+        </p:nvSpPr>
+        <p:spPr/>
+        <p:txBody>
+          <a:bodyPr>
+            <a:normAutofit/>
+          </a:bodyPr>
+          <a:lstStyle/>
+          <a:p>
+            <a:pPr>
+              <a:buClr>
+                <a:schemeClr val="tx1"/>
+              </a:buClr>
+            </a:pPr>
+            <a:r>
+              <a:rPr lang="bg-BG" sz="3600" b="1" dirty="0">
+                <a:solidFill>
+                  <a:schemeClr val="bg1"/>
+                </a:solidFill>
+              </a:rPr>
+              <a:t>Повтарянето на код </a:t>
+            </a:r>
+            <a:r>
+              <a:rPr lang="bg-BG" sz="3600" dirty="0"/>
+              <a:t>води до грешки</a:t>
+            </a:r>
+            <a:endParaRPr lang="en-GB" sz="3600" dirty="0"/>
+          </a:p>
+          <a:p>
+            <a:pPr>
+              <a:buClr>
+                <a:schemeClr val="tx1"/>
+              </a:buClr>
+            </a:pPr>
+            <a:r>
+              <a:rPr lang="bg-BG" sz="3600" b="1" dirty="0">
+                <a:solidFill>
+                  <a:schemeClr val="bg1"/>
+                </a:solidFill>
+              </a:rPr>
+              <a:t>Можем да преизползваме класове </a:t>
+            </a:r>
+            <a:r>
+              <a:rPr lang="bg-BG" sz="3600" dirty="0"/>
+              <a:t>чрез</a:t>
+            </a:r>
+            <a:r>
+              <a:rPr lang="en-GB" sz="3600" dirty="0"/>
+              <a:t> </a:t>
+            </a:r>
+            <a:r>
+              <a:rPr lang="bg-BG" sz="3600" b="1" dirty="0">
+                <a:solidFill>
+                  <a:schemeClr val="bg1"/>
+                </a:solidFill>
+              </a:rPr>
+              <a:t>разширяване</a:t>
+            </a:r>
+            <a:endParaRPr lang="en-GB" sz="3600" b="1" dirty="0">
+              <a:solidFill>
+                <a:schemeClr val="bg1"/>
+              </a:solidFill>
+            </a:endParaRPr>
+          </a:p>
+          <a:p>
+            <a:pPr lvl="1"/>
+            <a:r>
+              <a:rPr lang="bg-BG" sz="3400" dirty="0"/>
+              <a:t>Клас </a:t>
+            </a:r>
+            <a:r>
+              <a:rPr lang="en-US" sz="3400" dirty="0"/>
+              <a:t>A</a:t>
+            </a:r>
+            <a:r>
+              <a:rPr lang="bg-BG" sz="3400" dirty="0"/>
+              <a:t> </a:t>
+            </a:r>
+            <a:r>
+              <a:rPr lang="bg-BG" sz="3400" b="1" dirty="0"/>
+              <a:t>наследява</a:t>
+            </a:r>
+            <a:r>
+              <a:rPr lang="bg-BG" sz="3400" dirty="0"/>
+              <a:t> (</a:t>
+            </a:r>
+            <a:r>
+              <a:rPr lang="bg-BG" sz="3400" b="1" dirty="0"/>
+              <a:t>разширява</a:t>
+            </a:r>
+            <a:r>
+              <a:rPr lang="bg-BG" sz="3400" dirty="0"/>
+              <a:t> възможностите на) клас </a:t>
+            </a:r>
+            <a:r>
+              <a:rPr lang="en-US" sz="3400" dirty="0"/>
+              <a:t>B</a:t>
+            </a:r>
+            <a:endParaRPr lang="en-GB" sz="3400" dirty="0"/>
+          </a:p>
+        </p:txBody>
+      </p:sp>
+      <p:sp>
+        <p:nvSpPr>
+          <p:cNvPr id="4" name="Title 3"/>
+          <p:cNvSpPr>
+            <a:spLocks noGrp="1"/>
+          </p:cNvSpPr>
+          <p:nvPr>
+            <p:ph type="title"/>
+          </p:nvPr>
+        </p:nvSpPr>
+        <p:spPr/>
+        <p:txBody>
+          <a:bodyPr>
+            <a:normAutofit/>
+          </a:bodyPr>
+          <a:lstStyle/>
+          <a:p>
+            <a:r>
+              <a:rPr lang="bg-BG" dirty="0"/>
+              <a:t>Разширяване (наследяване)</a:t>
+            </a:r>
+            <a:endParaRPr lang="en-US" dirty="0"/>
+          </a:p>
+        </p:txBody>
+      </p:sp>
+      <p:sp>
+        <p:nvSpPr>
+          <p:cNvPr id="11" name="Rectangle: Rounded Corners 10"/>
+          <p:cNvSpPr/>
+          <p:nvPr/>
+        </p:nvSpPr>
+        <p:spPr>
+          <a:xfrm>
+            <a:off x="3191326" y="3609000"/>
+            <a:ext cx="4884674" cy="901418"/>
+          </a:xfrm>
+          <a:prstGeom prst="roundRect">
+            <a:avLst>
+              <a:gd name="adj" fmla="val 5385"/>
+            </a:avLst>
+          </a:prstGeom>
+          <a:solidFill>
+            <a:schemeClr val="tx1">
+              <a:lumMod val="75000"/>
+              <a:alpha val="30000"/>
+            </a:schemeClr>
+          </a:solidFill>
+          <a:ln w="57150">
+            <a:solidFill>
+              <a:schemeClr val="tx1"/>
+            </a:solidFill>
+            <a:prstDash val="sysDash"/>
+          </a:ln>
+        </p:spPr>
+        <p:style>
+          <a:lnRef idx="2">
+            <a:schemeClr val="accent1">
+              <a:shade val="50000"/>
+            </a:schemeClr>
+          </a:lnRef>
+          <a:fillRef idx="1">
+            <a:schemeClr val="accent1"/>
+          </a:fillRef>
+          <a:effectRef idx="0">
+            <a:schemeClr val="accent1"/>
+          </a:effectRef>
+          <a:fontRef idx="minor">
+            <a:schemeClr val="lt1"/>
+          </a:fontRef>
+        </p:style>
+        <p:txBody>
+          <a:bodyPr rtlCol="0" anchor="ctr" anchorCtr="0"/>
+          <a:lstStyle/>
+          <a:p>
+            <a:pPr algn="ctr"/>
+            <a:r>
+              <a:rPr lang="en-GB" sz="2800" b="1" dirty="0">
+                <a:solidFill>
+                  <a:schemeClr val="tx1"/>
+                </a:solidFill>
+              </a:rPr>
+              <a:t>Figure</a:t>
+            </a:r>
+          </a:p>
+        </p:txBody>
+      </p:sp>
+      <p:sp>
+        <p:nvSpPr>
+          <p:cNvPr id="13" name="Rectangle: Rounded Corners 12"/>
+          <p:cNvSpPr/>
+          <p:nvPr/>
+        </p:nvSpPr>
+        <p:spPr>
+          <a:xfrm>
+            <a:off x="2856090" y="5543500"/>
+            <a:ext cx="2609910" cy="720500"/>
+          </a:xfrm>
+          <a:prstGeom prst="roundRect">
+            <a:avLst>
+              <a:gd name="adj" fmla="val 5385"/>
+            </a:avLst>
+          </a:prstGeom>
+          <a:solidFill>
+            <a:schemeClr val="tx1">
+              <a:lumMod val="75000"/>
+              <a:alpha val="30000"/>
+            </a:schemeClr>
+          </a:solidFill>
+          <a:ln w="57150">
+            <a:solidFill>
+              <a:schemeClr val="tx1"/>
+            </a:solidFill>
+            <a:prstDash val="sysDash"/>
+          </a:ln>
+        </p:spPr>
+        <p:style>
+          <a:lnRef idx="2">
+            <a:schemeClr val="accent1">
+              <a:shade val="50000"/>
+            </a:schemeClr>
+          </a:lnRef>
+          <a:fillRef idx="1">
+            <a:schemeClr val="accent1"/>
+          </a:fillRef>
+          <a:effectRef idx="0">
+            <a:schemeClr val="accent1"/>
+          </a:effectRef>
+          <a:fontRef idx="minor">
+            <a:schemeClr val="lt1"/>
+          </a:fontRef>
+        </p:style>
+        <p:txBody>
+          <a:bodyPr rtlCol="0" anchor="ctr" anchorCtr="0"/>
           <a:lstStyle/>
           <a:p>
             <a:pPr algn="ctr"/>
             <a:r>
               <a:rPr lang="en-GB" sz="2800" b="1" noProof="1">
                 <a:solidFill>
-                  <a:schemeClr val="bg2"/>
+                  <a:schemeClr val="tx1"/>
                 </a:solidFill>
               </a:rPr>
-              <a:t>CustomList</a:t>
+              <a:t>Rectangle</a:t>
             </a:r>
           </a:p>
         </p:txBody>
@@ -10833,11 +12639,14 @@
         </p:nvSpPr>
         <p:spPr>
           <a:xfrm rot="16200000">
-            <a:off x="5528250" y="5249161"/>
-            <a:ext cx="661007" cy="192088"/>
+            <a:off x="3830542" y="4794036"/>
+            <a:ext cx="661007" cy="412480"/>
           </a:xfrm>
           <a:prstGeom prst="rightArrow">
-            <a:avLst/>
+            <a:avLst>
+              <a:gd name="adj1" fmla="val 50000"/>
+              <a:gd name="adj2" fmla="val 85673"/>
+            </a:avLst>
           </a:prstGeom>
           <a:solidFill>
             <a:schemeClr val="dk2">
@@ -10931,16 +12740,162 @@
             <a:fld id="{2BF067CD-8E6B-4360-9AA8-C5DF2A48A6D1}" type="slidenum">
               <a:rPr lang="en-US" noProof="0" smtClean="0"/>
               <a:pPr/>
-              <a:t>11</a:t>
+              <a:t>13</a:t>
             </a:fld>
             <a:endParaRPr lang="en-US" noProof="0" dirty="0"/>
+          </a:p>
+        </p:txBody>
+      </p:sp>
+      <p:sp>
+        <p:nvSpPr>
+          <p:cNvPr id="2" name="Rectangle: Rounded Corners 1">
+            <a:extLst>
+              <a:ext uri="{FF2B5EF4-FFF2-40B4-BE49-F238E27FC236}">
+                <a16:creationId xmlns:a16="http://schemas.microsoft.com/office/drawing/2014/main" id="{C1B95C7B-3B09-44C6-1B29-85FB5E8C3181}"/>
+              </a:ext>
+            </a:extLst>
+          </p:cNvPr>
+          <p:cNvSpPr/>
+          <p:nvPr/>
+        </p:nvSpPr>
+        <p:spPr>
+          <a:xfrm>
+            <a:off x="5869814" y="5543500"/>
+            <a:ext cx="2609910" cy="720500"/>
+          </a:xfrm>
+          <a:prstGeom prst="roundRect">
+            <a:avLst>
+              <a:gd name="adj" fmla="val 5385"/>
+            </a:avLst>
+          </a:prstGeom>
+          <a:solidFill>
+            <a:schemeClr val="tx1">
+              <a:lumMod val="75000"/>
+              <a:alpha val="30000"/>
+            </a:schemeClr>
+          </a:solidFill>
+          <a:ln w="57150">
+            <a:solidFill>
+              <a:schemeClr val="tx1"/>
+            </a:solidFill>
+            <a:prstDash val="sysDash"/>
+          </a:ln>
+        </p:spPr>
+        <p:style>
+          <a:lnRef idx="2">
+            <a:schemeClr val="accent1">
+              <a:shade val="50000"/>
+            </a:schemeClr>
+          </a:lnRef>
+          <a:fillRef idx="1">
+            <a:schemeClr val="accent1"/>
+          </a:fillRef>
+          <a:effectRef idx="0">
+            <a:schemeClr val="accent1"/>
+          </a:effectRef>
+          <a:fontRef idx="minor">
+            <a:schemeClr val="lt1"/>
+          </a:fontRef>
+        </p:style>
+        <p:txBody>
+          <a:bodyPr rtlCol="0" anchor="ctr" anchorCtr="0"/>
+          <a:lstStyle/>
+          <a:p>
+            <a:pPr algn="ctr"/>
+            <a:r>
+              <a:rPr lang="en-GB" sz="2800" b="1" noProof="1">
+                <a:solidFill>
+                  <a:schemeClr val="tx1"/>
+                </a:solidFill>
+              </a:rPr>
+              <a:t>Circle</a:t>
+            </a:r>
+          </a:p>
+        </p:txBody>
+      </p:sp>
+      <p:sp>
+        <p:nvSpPr>
+          <p:cNvPr id="5" name="Arrow: Right 29">
+            <a:extLst>
+              <a:ext uri="{FF2B5EF4-FFF2-40B4-BE49-F238E27FC236}">
+                <a16:creationId xmlns:a16="http://schemas.microsoft.com/office/drawing/2014/main" id="{D2221A0F-B95D-13A2-AE2A-B966C0FCD69D}"/>
+              </a:ext>
+            </a:extLst>
+          </p:cNvPr>
+          <p:cNvSpPr/>
+          <p:nvPr/>
+        </p:nvSpPr>
+        <p:spPr>
+          <a:xfrm rot="16200000">
+            <a:off x="6844265" y="4794036"/>
+            <a:ext cx="661007" cy="412479"/>
+          </a:xfrm>
+          <a:prstGeom prst="rightArrow">
+            <a:avLst>
+              <a:gd name="adj1" fmla="val 50000"/>
+              <a:gd name="adj2" fmla="val 78029"/>
+            </a:avLst>
+          </a:prstGeom>
+          <a:solidFill>
+            <a:schemeClr val="dk2">
+              <a:alpha val="80000"/>
+            </a:schemeClr>
+          </a:solidFill>
+          <a:ln w="19050">
+            <a:solidFill>
+              <a:schemeClr val="tx1">
+                <a:lumMod val="75000"/>
+                <a:alpha val="80000"/>
+              </a:schemeClr>
+            </a:solidFill>
+          </a:ln>
+          <a:effectLst/>
+        </p:spPr>
+        <p:style>
+          <a:lnRef idx="2">
+            <a:schemeClr val="accent1">
+              <a:shade val="50000"/>
+            </a:schemeClr>
+          </a:lnRef>
+          <a:fillRef idx="1001">
+            <a:schemeClr val="dk2"/>
+          </a:fillRef>
+          <a:effectRef idx="0">
+            <a:schemeClr val="accent1"/>
+          </a:effectRef>
+          <a:fontRef idx="minor">
+            <a:schemeClr val="lt1"/>
+          </a:fontRef>
+        </p:style>
+        <p:txBody>
+          <a:bodyPr rot="0" spcFirstLastPara="0" vertOverflow="overflow" horzOverflow="overflow" vert="horz" wrap="square" lIns="91440" tIns="45720" rIns="91440" bIns="45720" numCol="1" spcCol="0" rtlCol="0" fromWordArt="0" anchor="ctr" anchorCtr="0" forceAA="0" compatLnSpc="1">
+            <a:prstTxWarp prst="textNoShape">
+              <a:avLst/>
+            </a:prstTxWarp>
+            <a:noAutofit/>
+          </a:bodyPr>
+          <a:lstStyle/>
+          <a:p>
+            <a:pPr algn="ctr"/>
+            <a:endParaRPr lang="en-GB" sz="2800" b="1" dirty="0">
+              <a:solidFill>
+                <a:srgbClr val="FFFFFF"/>
+              </a:solidFill>
+              <a:effectLst>
+                <a:outerShdw blurRad="38100" dist="38100" dir="2700000" algn="tl">
+                  <a:srgbClr val="000000">
+                    <a:alpha val="43137"/>
+                  </a:srgbClr>
+                </a:outerShdw>
+              </a:effectLst>
+            </a:endParaRPr>
           </a:p>
         </p:txBody>
       </p:sp>
     </p:spTree>
     <p:extLst>
       <p:ext uri="{BB962C8B-B14F-4D97-AF65-F5344CB8AC3E}">
-        <p14:creationId xmlns:p14="http://schemas.microsoft.com/office/powerpoint/2010/main" val="3575903106"/>
+        <p14:creationId xmlns:p14="http://schemas.microsoft.com/office/powerpoint/2010/main" val="2240755261"/>
       </p:ext>
     </p:extLst>
   </p:cSld>
@@ -11100,21 +13055,66 @@
                                   </p:childTnLst>
                                 </p:cTn>
                               </p:par>
+                            </p:childTnLst>
+                          </p:cTn>
+                        </p:par>
+                      </p:childTnLst>
+                    </p:cTn>
+                  </p:par>
+                  <p:par>
+                    <p:cTn id="15" fill="hold">
+                      <p:stCondLst>
+                        <p:cond delay="indefinite"/>
+                      </p:stCondLst>
+                      <p:childTnLst>
+                        <p:par>
+                          <p:cTn id="16" fill="hold">
+                            <p:stCondLst>
+                              <p:cond delay="0"/>
+                            </p:stCondLst>
+                            <p:childTnLst>
                               <p:par>
-                                <p:cTn id="15" presetID="1" presetClass="entr" presetSubtype="0" fill="hold" grpId="0" nodeType="withEffect">
+                                <p:cTn id="17" presetID="1" presetClass="entr" presetSubtype="0" fill="hold" grpId="0" nodeType="clickEffect">
                                   <p:stCondLst>
                                     <p:cond delay="0"/>
                                   </p:stCondLst>
                                   <p:childTnLst>
                                     <p:set>
                                       <p:cBhvr>
-                                        <p:cTn id="16" dur="1" fill="hold">
+                                        <p:cTn id="18" dur="1" fill="hold">
                                           <p:stCondLst>
                                             <p:cond delay="0"/>
                                           </p:stCondLst>
                                         </p:cTn>
                                         <p:tgtEl>
-                                          <p:spTgt spid="12"/>
+                                          <p:spTgt spid="13"/>
+                                        </p:tgtEl>
+                                        <p:attrNameLst>
+                                          <p:attrName>style.visibility</p:attrName>
+                                        </p:attrNameLst>
+                                      </p:cBhvr>
+                                      <p:to>
+                                        <p:strVal val="visible"/>
+                                      </p:to>
+                                    </p:set>
+                                  </p:childTnLst>
+                                </p:cTn>
+                              </p:par>
+                              <p:par>
+                                <p:cTn id="19" presetID="1" presetClass="entr" presetSubtype="0" fill="hold" grpId="0" nodeType="withEffect">
+                                  <p:stCondLst>
+                                    <p:cond delay="0"/>
+                                  </p:stCondLst>
+                                  <p:childTnLst>
+                                    <p:set>
+                                      <p:cBhvr>
+                                        <p:cTn id="20" dur="1" fill="hold">
+                                          <p:stCondLst>
+                                            <p:cond delay="0"/>
+                                          </p:stCondLst>
+                                        </p:cTn>
+                                        <p:tgtEl>
+                                          <p:spTgt spid="10"/>
                                         </p:tgtEl>
                                         <p:attrNameLst>
                                           <p:attrName>style.visibility</p:attrName>
@@ -11134,32 +13134,32 @@
                     </p:cTn>
                   </p:par>
                   <p:par>
-                    <p:cTn id="17" fill="hold">
+                    <p:cTn id="21" fill="hold">
                       <p:stCondLst>
                         <p:cond delay="indefinite"/>
                       </p:stCondLst>
                       <p:childTnLst>
                         <p:par>
-                          <p:cTn id="18" fill="hold">
+                          <p:cTn id="22" fill="hold">
                             <p:stCondLst>
                               <p:cond delay="0"/>
                             </p:stCondLst>
                             <p:childTnLst>
                               <p:par>
-                                <p:cTn id="19" presetID="1" presetClass="entr" presetSubtype="0" fill="hold" grpId="0" nodeType="clickEffect">
+                                <p:cTn id="23" presetID="1" presetClass="entr" presetSubtype="0" fill="hold" grpId="0" nodeType="clickEffect">
                                   <p:stCondLst>
                                     <p:cond delay="0"/>
                                   </p:stCondLst>
                                   <p:childTnLst>
                                     <p:set>
                                       <p:cBhvr>
-                                        <p:cTn id="20" dur="1" fill="hold">
+                                        <p:cTn id="24" dur="1" fill="hold">
                                           <p:stCondLst>
                                             <p:cond delay="0"/>
                                           </p:stCondLst>
                                         </p:cTn>
                                         <p:tgtEl>
-                                          <p:spTgt spid="13"/>
+                                          <p:spTgt spid="2"/>
                                         </p:tgtEl>
                                         <p:attrNameLst>
                                           <p:attrName>style.visibility</p:attrName>
@@ -11173,20 +13173,20 @@
                                 </p:cTn>
                               </p:par>
                               <p:par>
-                                <p:cTn id="21" presetID="1" presetClass="entr" presetSubtype="0" fill="hold" grpId="0" nodeType="withEffect">
+                                <p:cTn id="25" presetID="1" presetClass="entr" presetSubtype="0" fill="hold" grpId="0" nodeType="withEffect">
                                   <p:stCondLst>
                                     <p:cond delay="0"/>
                                   </p:stCondLst>
                                   <p:childTnLst>
                                     <p:set>
                                       <p:cBhvr>
-                                        <p:cTn id="22" dur="1" fill="hold">
+                                        <p:cTn id="26" dur="1" fill="hold">
                                           <p:stCondLst>
                                             <p:cond delay="0"/>
                                           </p:stCondLst>
                                         </p:cTn>
                                         <p:tgtEl>
-                                          <p:spTgt spid="10"/>
+                                          <p:spTgt spid="5"/>
                                         </p:tgtEl>
                                         <p:attrNameLst>
                                           <p:attrName>style.visibility</p:attrName>
@@ -11228,15 +13228,16 @@
     </p:tnLst>
     <p:bldLst>
       <p:bldP spid="11" grpId="0" animBg="1"/>
-      <p:bldP spid="12" grpId="0" animBg="1"/>
       <p:bldP spid="13" grpId="0" animBg="1"/>
       <p:bldP spid="10" grpId="0" animBg="1"/>
+      <p:bldP spid="2" grpId="0" animBg="1"/>
+      <p:bldP spid="5" grpId="0" animBg="1"/>
     </p:bldLst>
   </p:timing>
 </p:sld>
 </file>
 
-<file path=ppt/slides/slide12.xml><?xml version="1.0" encoding="utf-8"?>
+<file path=ppt/slides/slide14.xml><?xml version="1.0" encoding="utf-8"?>
 <p:sld xmlns:a="http://schemas.openxmlformats.org/drawingml/2006/main" xmlns:r="http://schemas.openxmlformats.org/officeDocument/2006/relationships" xmlns:p="http://schemas.openxmlformats.org/presentationml/2006/main">
   <p:cSld>
     <p:spTree>
@@ -11269,26 +13270,17 @@
           <a:lstStyle/>
           <a:p>
             <a:r>
-              <a:rPr lang="bg-BG" dirty="0"/>
-              <a:t>Използваме класове, за да </a:t>
-            </a:r>
-            <a:r>
               <a:rPr lang="bg-BG" b="1" dirty="0">
                 <a:solidFill>
                   <a:schemeClr val="bg1"/>
                 </a:solidFill>
               </a:rPr>
-              <a:t>дефинираме</a:t>
-            </a:r>
-            <a:r>
-              <a:rPr lang="en-GB" dirty="0"/>
-              <a:t> </a:t>
+              <a:t>Композиция </a:t>
             </a:r>
             <a:r>
               <a:rPr lang="bg-BG" dirty="0"/>
-              <a:t>полета и свойства на класа</a:t>
-            </a:r>
-            <a:endParaRPr lang="en-GB" dirty="0"/>
+              <a:t>== един клас използва друг като част от себе си</a:t>
+            </a:r>
           </a:p>
         </p:txBody>
       </p:sp>
@@ -11327,8 +13319,8 @@
         </p:nvSpPr>
         <p:spPr>
           <a:xfrm>
-            <a:off x="1600200" y="2436905"/>
-            <a:ext cx="4436906" cy="3942149"/>
+            <a:off x="1064829" y="2386917"/>
+            <a:ext cx="4436906" cy="3480484"/>
           </a:xfrm>
           <a:prstGeom prst="rect">
             <a:avLst/>
@@ -11371,52 +13363,79 @@
             </a:lvl1pPr>
           </a:lstStyle>
           <a:p>
-            <a:r>
-              <a:rPr lang="en-US" sz="2600" dirty="0"/>
-              <a:t>class </a:t>
-            </a:r>
-            <a:r>
-              <a:rPr lang="en-GB" sz="2600" dirty="0"/>
-              <a:t>Laptop</a:t>
-            </a:r>
-            <a:r>
-              <a:rPr lang="en-US" sz="2600" dirty="0"/>
-              <a:t> </a:t>
-            </a:r>
-          </a:p>
-          <a:p>
-            <a:r>
-              <a:rPr lang="en-US" sz="2600" dirty="0"/>
+            <a:pPr>
+              <a:spcBef>
+                <a:spcPts val="0"/>
+              </a:spcBef>
+            </a:pPr>
+            <a:r>
+              <a:rPr lang="en-US" sz="2600" noProof="1"/>
+              <a:t>class Laptop </a:t>
+            </a:r>
+          </a:p>
+          <a:p>
+            <a:pPr>
+              <a:spcBef>
+                <a:spcPts val="0"/>
+              </a:spcBef>
+            </a:pPr>
+            <a:r>
+              <a:rPr lang="en-US" sz="2600" noProof="1"/>
               <a:t>{</a:t>
             </a:r>
           </a:p>
           <a:p>
-            <a:r>
-              <a:rPr lang="en-US" sz="2600" dirty="0"/>
-              <a:t>  Monitor monitor;</a:t>
-            </a:r>
-          </a:p>
-          <a:p>
-            <a:r>
-              <a:rPr lang="en-US" sz="2600" dirty="0"/>
+            <a:pPr>
+              <a:spcBef>
+                <a:spcPts val="0"/>
+              </a:spcBef>
+            </a:pPr>
+            <a:r>
+              <a:rPr lang="en-US" sz="2600" noProof="1"/>
+              <a:t>  Screen screen;</a:t>
+            </a:r>
+          </a:p>
+          <a:p>
+            <a:pPr>
+              <a:spcBef>
+                <a:spcPts val="0"/>
+              </a:spcBef>
+            </a:pPr>
+            <a:r>
+              <a:rPr lang="en-US" sz="2600" noProof="1"/>
               <a:t>  Touchpad touchpad;</a:t>
             </a:r>
           </a:p>
           <a:p>
-            <a:r>
-              <a:rPr lang="en-US" sz="2600" dirty="0"/>
+            <a:pPr>
+              <a:spcBef>
+                <a:spcPts val="0"/>
+              </a:spcBef>
+            </a:pPr>
+            <a:r>
+              <a:rPr lang="en-US" sz="2600" noProof="1"/>
               <a:t>  Keyboard keyboard;</a:t>
             </a:r>
           </a:p>
           <a:p>
-            <a:r>
-              <a:rPr lang="en-US" sz="2600" dirty="0"/>
+            <a:pPr>
+              <a:spcBef>
+                <a:spcPts val="0"/>
+              </a:spcBef>
+            </a:pPr>
+            <a:r>
+              <a:rPr lang="en-US" sz="2600" noProof="1"/>
               <a:t>  …</a:t>
             </a:r>
           </a:p>
           <a:p>
-            <a:r>
-              <a:rPr lang="en-US" sz="2600" dirty="0"/>
+            <a:pPr>
+              <a:spcBef>
+                <a:spcPts val="0"/>
+              </a:spcBef>
+            </a:pPr>
+            <a:r>
+              <a:rPr lang="en-US" sz="2600" noProof="1"/>
               <a:t>}</a:t>
             </a:r>
           </a:p>
@@ -11432,12 +13451,12 @@
         </p:nvSpPr>
         <p:spPr bwMode="auto">
           <a:xfrm>
-            <a:off x="3216000" y="5385344"/>
+            <a:off x="2590629" y="5031136"/>
             <a:ext cx="2766682" cy="919401"/>
           </a:xfrm>
           <a:prstGeom prst="wedgeRoundRectCallout">
             <a:avLst>
-              <a:gd name="adj1" fmla="val -73261"/>
+              <a:gd name="adj1" fmla="val -69842"/>
               <a:gd name="adj2" fmla="val -68626"/>
               <a:gd name="adj3" fmla="val 16667"/>
             </a:avLst>
@@ -11618,7 +13637,7 @@
                   <a:schemeClr val="bg2"/>
                 </a:solidFill>
               </a:rPr>
-              <a:t>Monitor</a:t>
+              <a:t>Screen</a:t>
             </a:r>
             <a:endParaRPr lang="en-US" sz="2800" b="1" dirty="0">
               <a:solidFill>
@@ -11796,7 +13815,7 @@
             <a:fld id="{2BF067CD-8E6B-4360-9AA8-C5DF2A48A6D1}" type="slidenum">
               <a:rPr lang="en-US" noProof="0" smtClean="0"/>
               <a:pPr/>
-              <a:t>12</a:t>
+              <a:t>14</a:t>
             </a:fld>
             <a:endParaRPr lang="en-US" noProof="0" dirty="0"/>
           </a:p>
@@ -12077,7 +14096,7 @@
 </p:sld>
 </file>
 
-<file path=ppt/slides/slide13.xml><?xml version="1.0" encoding="utf-8"?>
+<file path=ppt/slides/slide15.xml><?xml version="1.0" encoding="utf-8"?>
 <p:sld xmlns:a="http://schemas.openxmlformats.org/drawingml/2006/main" xmlns:r="http://schemas.openxmlformats.org/officeDocument/2006/relationships" xmlns:p="http://schemas.openxmlformats.org/presentationml/2006/main">
   <p:cSld>
     <p:spTree>
@@ -12604,7 +14623,7 @@
             <a:fld id="{2BF067CD-8E6B-4360-9AA8-C5DF2A48A6D1}" type="slidenum">
               <a:rPr lang="en-US" smtClean="0"/>
               <a:pPr/>
-              <a:t>13</a:t>
+              <a:t>15</a:t>
             </a:fld>
             <a:endParaRPr lang="en-US" dirty="0"/>
           </a:p>
@@ -12706,7 +14725,7 @@
 </p:sld>
 </file>
 
-<file path=ppt/slides/slide14.xml><?xml version="1.0" encoding="utf-8"?>
+<file path=ppt/slides/slide16.xml><?xml version="1.0" encoding="utf-8"?>
 <p:sld xmlns:a="http://schemas.openxmlformats.org/drawingml/2006/main" xmlns:r="http://schemas.openxmlformats.org/officeDocument/2006/relationships" xmlns:p="http://schemas.openxmlformats.org/presentationml/2006/main">
   <p:cSld>
     <p:spTree>
@@ -13075,7 +15094,7 @@
             <a:fld id="{2BF067CD-8E6B-4360-9AA8-C5DF2A48A6D1}" type="slidenum">
               <a:rPr lang="en-US" noProof="0" smtClean="0"/>
               <a:pPr/>
-              <a:t>14</a:t>
+              <a:t>16</a:t>
             </a:fld>
             <a:endParaRPr lang="en-US" noProof="0" dirty="0"/>
           </a:p>
@@ -13102,7 +15121,7 @@
 </p:sld>
 </file>
 
-<file path=ppt/slides/slide15.xml><?xml version="1.0" encoding="utf-8"?>
+<file path=ppt/slides/slide17.xml><?xml version="1.0" encoding="utf-8"?>
 <p:sld xmlns:a="http://schemas.openxmlformats.org/drawingml/2006/main" xmlns:r="http://schemas.openxmlformats.org/officeDocument/2006/relationships" xmlns:p="http://schemas.openxmlformats.org/presentationml/2006/main">
   <p:cSld>
     <p:spTree>
@@ -13595,7 +15614,7 @@
             <a:fld id="{2BF067CD-8E6B-4360-9AA8-C5DF2A48A6D1}" type="slidenum">
               <a:rPr lang="en-US" smtClean="0"/>
               <a:pPr/>
-              <a:t>15</a:t>
+              <a:t>17</a:t>
             </a:fld>
             <a:endParaRPr lang="en-US" dirty="0"/>
           </a:p>
@@ -14003,7 +16022,7 @@
 </p:sld>
 </file>
 
-<file path=ppt/slides/slide16.xml><?xml version="1.0" encoding="utf-8"?>
+<file path=ppt/slides/slide18.xml><?xml version="1.0" encoding="utf-8"?>
 <p:sld xmlns:a="http://schemas.openxmlformats.org/drawingml/2006/main" xmlns:r="http://schemas.openxmlformats.org/officeDocument/2006/relationships" xmlns:p="http://schemas.openxmlformats.org/presentationml/2006/main">
   <p:cSld>
     <p:spTree>
@@ -14160,7 +16179,7 @@
         <p:grpSpPr>
           <a:xfrm>
             <a:off x="191942" y="1419750"/>
-            <a:ext cx="8919058" cy="5300339"/>
+            <a:ext cx="9714058" cy="5300339"/>
             <a:chOff x="472011" y="1508786"/>
             <a:chExt cx="3799787" cy="4865561"/>
           </a:xfrm>
@@ -14368,8 +16387,8 @@
         </p:blipFill>
         <p:spPr>
           <a:xfrm flipH="1">
-            <a:off x="8824937" y="3276641"/>
-            <a:ext cx="2882677" cy="3119781"/>
+            <a:off x="9652220" y="3699000"/>
+            <a:ext cx="2284517" cy="2472422"/>
           </a:xfrm>
           <a:prstGeom prst="rect">
             <a:avLst/>
@@ -14392,8 +16411,8 @@
         </p:nvSpPr>
         <p:spPr>
           <a:xfrm>
-            <a:off x="543073" y="1723769"/>
-            <a:ext cx="8281864" cy="4772370"/>
+            <a:off x="575545" y="1797442"/>
+            <a:ext cx="9210455" cy="4625835"/>
           </a:xfrm>
           <a:prstGeom prst="rect">
             <a:avLst/>
@@ -14571,7 +16590,22 @@
             </a:lvl9pPr>
           </a:lstStyle>
           <a:p>
-            <a:pPr>
+            <a:pPr latinLnBrk="0">
+              <a:lnSpc>
+                <a:spcPct val="100000"/>
+              </a:lnSpc>
+            </a:pPr>
+            <a:r>
+              <a:rPr lang="bg-BG" sz="3600" dirty="0">
+                <a:solidFill>
+                  <a:schemeClr val="bg2"/>
+                </a:solidFill>
+              </a:rPr>
+              <a:t>ОО моделиране: наследяване, асоциация, композиция, агрегация, делегиране</a:t>
+            </a:r>
+          </a:p>
+          <a:p>
+            <a:pPr latinLnBrk="0">
               <a:lnSpc>
                 <a:spcPct val="100000"/>
               </a:lnSpc>
@@ -14612,7 +16646,7 @@
             </a:endParaRPr>
           </a:p>
           <a:p>
-            <a:pPr>
+            <a:pPr latinLnBrk="0">
               <a:lnSpc>
                 <a:spcPct val="100000"/>
               </a:lnSpc>
@@ -14629,7 +16663,7 @@
                   </a:schemeClr>
                 </a:solidFill>
               </a:rPr>
-              <a:t>Подкласа наследява </a:t>
+              <a:t>Класът-наследник наследява </a:t>
             </a:r>
             <a:r>
               <a:rPr lang="bg-BG" sz="3600" dirty="0">
@@ -14682,23 +16716,8 @@
                   </a:schemeClr>
                 </a:solidFill>
               </a:rPr>
-              <a:t>презаписва</a:t>
-            </a:r>
-            <a:r>
-              <a:rPr lang="en-US" sz="3600" dirty="0">
-                <a:solidFill>
-                  <a:schemeClr val="bg2"/>
-                </a:solidFill>
-              </a:rPr>
-              <a:t> </a:t>
-            </a:r>
-            <a:br>
-              <a:rPr lang="bg-BG" sz="3600" dirty="0">
-                <a:solidFill>
-                  <a:schemeClr val="bg2"/>
-                </a:solidFill>
-              </a:rPr>
-            </a:br>
+              <a:t>презаписва </a:t>
+            </a:r>
             <a:r>
               <a:rPr lang="bg-BG" sz="3600" dirty="0">
                 <a:solidFill>
@@ -14714,7 +16733,7 @@
             </a:endParaRPr>
           </a:p>
           <a:p>
-            <a:pPr>
+            <a:pPr latinLnBrk="0">
               <a:lnSpc>
                 <a:spcPct val="100000"/>
               </a:lnSpc>
@@ -14828,7 +16847,7 @@
             <a:fld id="{2BF067CD-8E6B-4360-9AA8-C5DF2A48A6D1}" type="slidenum">
               <a:rPr lang="en-US" noProof="0" smtClean="0"/>
               <a:pPr/>
-              <a:t>16</a:t>
+              <a:t>18</a:t>
             </a:fld>
             <a:endParaRPr lang="en-US" noProof="0" dirty="0"/>
           </a:p>
@@ -14958,6 +16977,55 @@
                       </p:childTnLst>
                     </p:cTn>
                   </p:par>
+                  <p:par>
+                    <p:cTn id="11" fill="hold">
+                      <p:stCondLst>
+                        <p:cond delay="indefinite"/>
+                      </p:stCondLst>
+                      <p:childTnLst>
+                        <p:par>
+                          <p:cTn id="12" fill="hold">
+                            <p:stCondLst>
+                              <p:cond delay="0"/>
+                            </p:stCondLst>
+                            <p:childTnLst>
+                              <p:par>
+                                <p:cTn id="13" presetID="1" presetClass="entr" presetSubtype="0" fill="hold" nodeType="clickEffect">
+                                  <p:stCondLst>
+                                    <p:cond delay="0"/>
+                                  </p:stCondLst>
+                                  <p:childTnLst>
+                                    <p:set>
+                                      <p:cBhvr>
+                                        <p:cTn id="14" dur="1" fill="hold">
+                                          <p:stCondLst>
+                                            <p:cond delay="0"/>
+                                          </p:stCondLst>
+                                        </p:cTn>
+                                        <p:tgtEl>
+                                          <p:spTgt spid="15">
+                                            <p:txEl>
+                                              <p:pRg st="3" end="3"/>
+                                            </p:txEl>
+                                          </p:spTgt>
+                                        </p:tgtEl>
+                                        <p:attrNameLst>
+                                          <p:attrName>style.visibility</p:attrName>
+                                        </p:attrNameLst>
+                                      </p:cBhvr>
+                                      <p:to>
+                                        <p:strVal val="visible"/>
+                                      </p:to>
+                                    </p:set>
+                                  </p:childTnLst>
+                                </p:cTn>
+                              </p:par>
+                            </p:childTnLst>
+                          </p:cTn>
+                        </p:par>
+                      </p:childTnLst>
+                    </p:cTn>
+                  </p:par>
                 </p:childTnLst>
               </p:cTn>
               <p:prevCondLst>
@@ -14983,7 +17051,7 @@
 </p:sld>
 </file>
 
-<file path=ppt/slides/slide17.xml><?xml version="1.0" encoding="utf-8"?>
+<file path=ppt/slides/slide19.xml><?xml version="1.0" encoding="utf-8"?>
 <p:sld xmlns:a="http://schemas.openxmlformats.org/drawingml/2006/main" xmlns:r="http://schemas.openxmlformats.org/officeDocument/2006/relationships" xmlns:p="http://schemas.openxmlformats.org/presentationml/2006/main">
   <p:cSld>
     <p:spTree>
@@ -15045,306 +17113,6 @@
     <p:extLst>
       <p:ext uri="{BB962C8B-B14F-4D97-AF65-F5344CB8AC3E}">
         <p14:creationId xmlns:p14="http://schemas.microsoft.com/office/powerpoint/2010/main" val="3140127689"/>
-      </p:ext>
-    </p:extLst>
-  </p:cSld>
-  <p:clrMapOvr>
-    <a:masterClrMapping/>
-  </p:clrMapOvr>
-  <mc:AlternateContent xmlns:mc="http://schemas.openxmlformats.org/markup-compatibility/2006" xmlns:p14="http://schemas.microsoft.com/office/powerpoint/2010/main">
-    <mc:Choice Requires="p14">
-      <p:transition spd="slow" p14:dur="2000" advClick="0" advTm="5000"/>
-    </mc:Choice>
-    <mc:Fallback xmlns="">
-      <p:transition spd="slow" advClick="0" advTm="5000"/>
-    </mc:Fallback>
-  </mc:AlternateContent>
-</p:sld>
-</file>
-
-<file path=ppt/slides/slide18.xml><?xml version="1.0" encoding="utf-8"?>
-<p:sld xmlns:a="http://schemas.openxmlformats.org/drawingml/2006/main" xmlns:r="http://schemas.openxmlformats.org/officeDocument/2006/relationships" xmlns:p="http://schemas.openxmlformats.org/presentationml/2006/main">
-  <p:cSld>
-    <p:spTree>
-      <p:nvGrpSpPr>
-        <p:cNvPr id="1" name=""/>
-        <p:cNvGrpSpPr/>
-        <p:nvPr/>
-      </p:nvGrpSpPr>
-      <p:grpSpPr>
-        <a:xfrm>
-          <a:off x="0" y="0"/>
-          <a:ext cx="0" cy="0"/>
-          <a:chOff x="0" y="0"/>
-          <a:chExt cx="0" cy="0"/>
-        </a:xfrm>
-      </p:grpSpPr>
-      <p:sp>
-        <p:nvSpPr>
-          <p:cNvPr id="2" name="Slide Body">
-            <a:extLst>
-              <a:ext uri="{FF2B5EF4-FFF2-40B4-BE49-F238E27FC236}">
-                <a16:creationId xmlns:a16="http://schemas.microsoft.com/office/drawing/2014/main" id="{980F49B1-E4BE-4389-A747-7AB9B71AD920}"/>
-              </a:ext>
-            </a:extLst>
-          </p:cNvPr>
-          <p:cNvSpPr>
-            <a:spLocks noGrp="1"/>
-          </p:cNvSpPr>
-          <p:nvPr>
-            <p:ph type="body" sz="quarter" idx="10"/>
-          </p:nvPr>
-        </p:nvSpPr>
-        <p:spPr>
-          <a:xfrm>
-            <a:off x="190402" y="1269001"/>
-            <a:ext cx="11818096" cy="5455890"/>
-          </a:xfrm>
-        </p:spPr>
-        <p:txBody>
-          <a:bodyPr/>
-          <a:lstStyle/>
-          <a:p>
-            <a:pPr>
-              <a:lnSpc>
-                <a:spcPct val="120000"/>
-              </a:lnSpc>
-            </a:pPr>
-            <a:r>
-              <a:rPr lang="bg-BG" dirty="0"/>
-              <a:t>Този курс</a:t>
-            </a:r>
-            <a:r>
-              <a:rPr lang="en-US" dirty="0"/>
-              <a:t> (</a:t>
-            </a:r>
-            <a:r>
-              <a:rPr lang="bg-BG" dirty="0"/>
-              <a:t>презентации, примери, демонстрационен код, упражнения, домашни, видео и други активи</a:t>
-            </a:r>
-            <a:r>
-              <a:rPr lang="en-US" dirty="0"/>
-              <a:t>) </a:t>
-            </a:r>
-            <a:r>
-              <a:rPr lang="bg-BG" dirty="0"/>
-              <a:t>представлява</a:t>
-            </a:r>
-            <a:r>
-              <a:rPr lang="en-US" dirty="0"/>
-              <a:t> </a:t>
-            </a:r>
-            <a:r>
-              <a:rPr lang="bg-BG" b="1" dirty="0"/>
-              <a:t>защитено авторско съдържание</a:t>
-            </a:r>
-            <a:endParaRPr lang="en-US" dirty="0"/>
-          </a:p>
-          <a:p>
-            <a:pPr>
-              <a:lnSpc>
-                <a:spcPct val="120000"/>
-              </a:lnSpc>
-            </a:pPr>
-            <a:r>
-              <a:rPr lang="bg-BG" dirty="0"/>
-              <a:t>Нерегламентирано копиране</a:t>
-            </a:r>
-            <a:r>
-              <a:rPr lang="en-US" dirty="0"/>
-              <a:t>,</a:t>
-            </a:r>
-            <a:r>
-              <a:rPr lang="bg-BG" dirty="0"/>
-              <a:t> разпространение или използване е незаконно</a:t>
-            </a:r>
-          </a:p>
-          <a:p>
-            <a:pPr>
-              <a:lnSpc>
-                <a:spcPct val="120000"/>
-              </a:lnSpc>
-            </a:pPr>
-            <a:r>
-              <a:rPr lang="en-US" dirty="0"/>
-              <a:t>© </a:t>
-            </a:r>
-            <a:r>
-              <a:rPr lang="bg-BG" dirty="0"/>
-              <a:t>СофтУни</a:t>
-            </a:r>
-            <a:r>
-              <a:rPr lang="en-US" dirty="0"/>
-              <a:t> – </a:t>
-            </a:r>
-            <a:r>
-              <a:rPr lang="en-US" dirty="0">
-                <a:hlinkClick r:id="rId3"/>
-              </a:rPr>
-              <a:t>https://softuni.org</a:t>
-            </a:r>
-            <a:endParaRPr lang="en-US" dirty="0"/>
-          </a:p>
-          <a:p>
-            <a:pPr>
-              <a:lnSpc>
-                <a:spcPct val="120000"/>
-              </a:lnSpc>
-            </a:pPr>
-            <a:r>
-              <a:rPr lang="en-US" dirty="0"/>
-              <a:t>© </a:t>
-            </a:r>
-            <a:r>
-              <a:rPr lang="bg-BG" dirty="0"/>
-              <a:t>Софтуерен университет</a:t>
-            </a:r>
-            <a:r>
-              <a:rPr lang="en-US" dirty="0"/>
-              <a:t> – </a:t>
-            </a:r>
-            <a:r>
-              <a:rPr lang="en-US" dirty="0">
-                <a:hlinkClick r:id="rId4"/>
-              </a:rPr>
-              <a:t>https://softuni.bg</a:t>
-            </a:r>
-            <a:endParaRPr lang="bg-BG" dirty="0"/>
-          </a:p>
-          <a:p>
-            <a:pPr>
-              <a:lnSpc>
-                <a:spcPct val="120000"/>
-              </a:lnSpc>
-            </a:pPr>
-            <a:endParaRPr lang="bg-BG" dirty="0"/>
-          </a:p>
-          <a:p>
-            <a:pPr marL="0" indent="0">
-              <a:lnSpc>
-                <a:spcPct val="120000"/>
-              </a:lnSpc>
-              <a:buNone/>
-            </a:pPr>
-            <a:endParaRPr lang="bg-BG" dirty="0"/>
-          </a:p>
-        </p:txBody>
-      </p:sp>
-      <p:pic>
-        <p:nvPicPr>
-          <p:cNvPr id="6" name="Picture License" descr="License">
-            <a:extLst>
-              <a:ext uri="{FF2B5EF4-FFF2-40B4-BE49-F238E27FC236}">
-                <a16:creationId xmlns:a16="http://schemas.microsoft.com/office/drawing/2014/main" id="{A10A2585-858C-4B1E-8846-27CF1C15729E}"/>
-              </a:ext>
-            </a:extLst>
-          </p:cNvPr>
-          <p:cNvPicPr>
-            <a:picLocks noChangeAspect="1"/>
-          </p:cNvPicPr>
-          <p:nvPr/>
-        </p:nvPicPr>
-        <p:blipFill>
-          <a:blip r:embed="rId5">
-            <a:clrChange>
-              <a:clrFrom>
-                <a:srgbClr val="FFFFFF"/>
-              </a:clrFrom>
-              <a:clrTo>
-                <a:srgbClr val="FFFFFF">
-                  <a:alpha val="0"/>
-                </a:srgbClr>
-              </a:clrTo>
-            </a:clrChange>
-          </a:blip>
-          <a:stretch>
-            <a:fillRect/>
-          </a:stretch>
-        </p:blipFill>
-        <p:spPr>
-          <a:xfrm>
-            <a:off x="9745023" y="4445455"/>
-            <a:ext cx="1930977" cy="2043545"/>
-          </a:xfrm>
-          <a:prstGeom prst="rect">
-            <a:avLst/>
-          </a:prstGeom>
-        </p:spPr>
-      </p:pic>
-      <p:sp>
-        <p:nvSpPr>
-          <p:cNvPr id="3" name="Slide Title">
-            <a:extLst>
-              <a:ext uri="{FF2B5EF4-FFF2-40B4-BE49-F238E27FC236}">
-                <a16:creationId xmlns:a16="http://schemas.microsoft.com/office/drawing/2014/main" id="{E5F1FB41-80C3-4816-BC47-CCC50632E6E8}"/>
-              </a:ext>
-            </a:extLst>
-          </p:cNvPr>
-          <p:cNvSpPr>
-            <a:spLocks noGrp="1"/>
-          </p:cNvSpPr>
-          <p:nvPr>
-            <p:ph type="title"/>
-          </p:nvPr>
-        </p:nvSpPr>
-        <p:spPr/>
-        <p:txBody>
-          <a:bodyPr/>
-          <a:lstStyle/>
-          <a:p>
-            <a:r>
-              <a:rPr lang="bg-BG" dirty="0"/>
-              <a:t>Лиценз</a:t>
-            </a:r>
-          </a:p>
-        </p:txBody>
-      </p:sp>
-      <p:sp>
-        <p:nvSpPr>
-          <p:cNvPr id="7" name="Slide Number">
-            <a:extLst>
-              <a:ext uri="{FF2B5EF4-FFF2-40B4-BE49-F238E27FC236}">
-                <a16:creationId xmlns:a16="http://schemas.microsoft.com/office/drawing/2014/main" id="{0B20C9FE-51B9-4CA1-A3B4-E16FBFC084A5}"/>
-              </a:ext>
-            </a:extLst>
-          </p:cNvPr>
-          <p:cNvSpPr>
-            <a:spLocks noGrp="1"/>
-          </p:cNvSpPr>
-          <p:nvPr>
-            <p:ph type="sldNum" sz="quarter" idx="5"/>
-          </p:nvPr>
-        </p:nvSpPr>
-        <p:spPr>
-          <a:xfrm>
-            <a:off x="11753030" y="6507000"/>
-            <a:ext cx="367414" cy="297000"/>
-          </a:xfrm>
-          <a:prstGeom prst="rect">
-            <a:avLst/>
-          </a:prstGeom>
-        </p:spPr>
-        <p:txBody>
-          <a:bodyPr vert="horz" lIns="91440" tIns="45720" rIns="91440" bIns="45720" rtlCol="0" anchor="b"/>
-          <a:lstStyle>
-            <a:lvl1pPr algn="r">
-              <a:defRPr sz="1000"/>
-            </a:lvl1pPr>
-          </a:lstStyle>
-          <a:p>
-            <a:fld id="{2BF067CD-8E6B-4360-9AA8-C5DF2A48A6D1}" type="slidenum">
-              <a:rPr lang="en-US" noProof="0" smtClean="0"/>
-              <a:pPr/>
-              <a:t>18</a:t>
-            </a:fld>
-            <a:endParaRPr lang="en-US" noProof="0" dirty="0"/>
-          </a:p>
-        </p:txBody>
-      </p:sp>
-    </p:spTree>
-    <p:extLst>
-      <p:ext uri="{BB962C8B-B14F-4D97-AF65-F5344CB8AC3E}">
-        <p14:creationId xmlns:p14="http://schemas.microsoft.com/office/powerpoint/2010/main" val="229369013"/>
       </p:ext>
     </p:extLst>
   </p:cSld>
@@ -15381,6 +17149,44 @@
       </p:grpSpPr>
       <p:sp>
         <p:nvSpPr>
+          <p:cNvPr id="5" name="Slide Number">
+            <a:extLst>
+              <a:ext uri="{FF2B5EF4-FFF2-40B4-BE49-F238E27FC236}">
+                <a16:creationId xmlns:a16="http://schemas.microsoft.com/office/drawing/2014/main" id="{45B3E92B-F4BB-4BA3-9596-FAB74B56C53D}"/>
+              </a:ext>
+            </a:extLst>
+          </p:cNvPr>
+          <p:cNvSpPr>
+            <a:spLocks noGrp="1"/>
+          </p:cNvSpPr>
+          <p:nvPr>
+            <p:ph type="sldNum" sz="quarter" idx="4"/>
+          </p:nvPr>
+        </p:nvSpPr>
+        <p:spPr>
+          <a:prstGeom prst="rect">
+            <a:avLst/>
+          </a:prstGeom>
+        </p:spPr>
+        <p:txBody>
+          <a:bodyPr vert="horz" lIns="91440" tIns="45720" rIns="91440" bIns="45720" rtlCol="0" anchor="b"/>
+          <a:lstStyle>
+            <a:lvl1pPr algn="r">
+              <a:defRPr sz="1000"/>
+            </a:lvl1pPr>
+          </a:lstStyle>
+          <a:p>
+            <a:fld id="{2BF067CD-8E6B-4360-9AA8-C5DF2A48A6D1}" type="slidenum">
+              <a:rPr lang="en-US" noProof="0" smtClean="0"/>
+              <a:pPr/>
+              <a:t>2</a:t>
+            </a:fld>
+            <a:endParaRPr lang="en-US" noProof="0" dirty="0"/>
+          </a:p>
+        </p:txBody>
+      </p:sp>
+      <p:sp>
+        <p:nvSpPr>
           <p:cNvPr id="3" name="Content Placeholder 2">
             <a:extLst>
               <a:ext uri="{FF2B5EF4-FFF2-40B4-BE49-F238E27FC236}">
@@ -15392,13 +17198,13 @@
             <a:spLocks noGrp="1"/>
           </p:cNvSpPr>
           <p:nvPr>
-            <p:ph type="body" sz="quarter" idx="10"/>
+            <p:ph type="body" sz="quarter" idx="13"/>
           </p:nvPr>
         </p:nvSpPr>
         <p:spPr>
           <a:xfrm>
-            <a:off x="190406" y="664617"/>
-            <a:ext cx="11818096" cy="5528766"/>
+            <a:off x="196766" y="1238354"/>
+            <a:ext cx="9049234" cy="5430646"/>
           </a:xfrm>
         </p:spPr>
         <p:txBody>
@@ -15411,7 +17217,15 @@
               <a:buFont typeface="+mj-lt"/>
               <a:buAutoNum type="arabicPeriod"/>
             </a:pPr>
-            <a:endParaRPr lang="bg-BG" sz="3600" dirty="0"/>
+            <a:r>
+              <a:rPr lang="bg-BG" sz="3600" dirty="0"/>
+              <a:t>Преизползване на код при наследяване: </a:t>
+            </a:r>
+            <a:r>
+              <a:rPr lang="bg-BG" sz="3600" b="1" dirty="0"/>
+              <a:t>виртуални методи</a:t>
+            </a:r>
+            <a:endParaRPr lang="en-US" sz="3600" b="1" dirty="0"/>
           </a:p>
           <a:p>
             <a:pPr marL="514350" indent="-514350">
@@ -15420,39 +17234,78 @@
             </a:pPr>
             <a:r>
               <a:rPr lang="bg-BG" sz="3600" dirty="0"/>
-              <a:t>Преизползване на класове</a:t>
-            </a:r>
-            <a:endParaRPr lang="en-US" sz="3600" dirty="0"/>
-          </a:p>
-          <a:p>
-            <a:pPr marL="514350" indent="-514350">
-              <a:buFont typeface="+mj-lt"/>
-              <a:buAutoNum type="arabicPeriod"/>
-            </a:pPr>
-            <a:r>
+              <a:t>Обектно-ориентирано моделиране</a:t>
+            </a:r>
+            <a:br>
               <a:rPr lang="bg-BG" sz="3600" dirty="0"/>
-              <a:t>Видове преизползване на класове</a:t>
+            </a:br>
+            <a:r>
+              <a:rPr lang="bg-BG" sz="3600" dirty="0"/>
+              <a:t>(</a:t>
+            </a:r>
+            <a:r>
+              <a:rPr lang="bg-BG" sz="3600" b="1" dirty="0"/>
+              <a:t>ОО моделиране</a:t>
+            </a:r>
+            <a:r>
+              <a:rPr lang="bg-BG" sz="3600" dirty="0"/>
+              <a:t>)</a:t>
             </a:r>
           </a:p>
           <a:p>
             <a:pPr lvl="1"/>
             <a:r>
+              <a:rPr lang="bg-BG" sz="3400" b="1" dirty="0"/>
+              <a:t>Разширяване</a:t>
+            </a:r>
+            <a:r>
               <a:rPr lang="bg-BG" sz="3400" dirty="0"/>
-              <a:t>Разширяване</a:t>
+              <a:t> (наследяване)</a:t>
             </a:r>
           </a:p>
           <a:p>
             <a:pPr lvl="1"/>
             <a:r>
+              <a:rPr lang="bg-BG" sz="3400" b="1" dirty="0"/>
+              <a:t>Асоциация</a:t>
+            </a:r>
+            <a:r>
               <a:rPr lang="bg-BG" sz="3400" dirty="0"/>
-              <a:t>Композиция</a:t>
+              <a:t>, </a:t>
+            </a:r>
+            <a:r>
+              <a:rPr lang="bg-BG" sz="3400" b="1" dirty="0"/>
+              <a:t>композиция</a:t>
+            </a:r>
+            <a:r>
+              <a:rPr lang="bg-BG" sz="3400" dirty="0"/>
+              <a:t> и </a:t>
+            </a:r>
+            <a:r>
+              <a:rPr lang="bg-BG" sz="3400" b="1" dirty="0"/>
+              <a:t>агрегация</a:t>
             </a:r>
           </a:p>
           <a:p>
             <a:pPr lvl="1"/>
             <a:r>
+              <a:rPr lang="bg-BG" sz="3400" b="1" dirty="0"/>
+              <a:t>Множественост</a:t>
+            </a:r>
+            <a:r>
               <a:rPr lang="bg-BG" sz="3400" dirty="0"/>
+              <a:t>: 1-1, 1-*, *-1, *-*</a:t>
+            </a:r>
+          </a:p>
+          <a:p>
+            <a:pPr lvl="1"/>
+            <a:r>
+              <a:rPr lang="bg-BG" sz="3400" b="1" dirty="0"/>
               <a:t>Делегиране</a:t>
+            </a:r>
+            <a:r>
+              <a:rPr lang="bg-BG" sz="3400" dirty="0"/>
+              <a:t>: прехвърляне на отговорност</a:t>
             </a:r>
             <a:endParaRPr lang="en-US" sz="3400" dirty="0"/>
           </a:p>
@@ -15484,48 +17337,6 @@
               <a:t>Съдържание</a:t>
             </a:r>
             <a:endParaRPr lang="en-US" dirty="0"/>
-          </a:p>
-        </p:txBody>
-      </p:sp>
-      <p:sp>
-        <p:nvSpPr>
-          <p:cNvPr id="5" name="Slide Number">
-            <a:extLst>
-              <a:ext uri="{FF2B5EF4-FFF2-40B4-BE49-F238E27FC236}">
-                <a16:creationId xmlns:a16="http://schemas.microsoft.com/office/drawing/2014/main" id="{45B3E92B-F4BB-4BA3-9596-FAB74B56C53D}"/>
-              </a:ext>
-            </a:extLst>
-          </p:cNvPr>
-          <p:cNvSpPr>
-            <a:spLocks noGrp="1"/>
-          </p:cNvSpPr>
-          <p:nvPr>
-            <p:ph type="sldNum" sz="quarter" idx="5"/>
-          </p:nvPr>
-        </p:nvSpPr>
-        <p:spPr>
-          <a:xfrm>
-            <a:off x="11753030" y="6507000"/>
-            <a:ext cx="367414" cy="297000"/>
-          </a:xfrm>
-          <a:prstGeom prst="rect">
-            <a:avLst/>
-          </a:prstGeom>
-        </p:spPr>
-        <p:txBody>
-          <a:bodyPr vert="horz" lIns="91440" tIns="45720" rIns="91440" bIns="45720" rtlCol="0" anchor="b"/>
-          <a:lstStyle>
-            <a:lvl1pPr algn="r">
-              <a:defRPr sz="1000"/>
-            </a:lvl1pPr>
-          </a:lstStyle>
-          <a:p>
-            <a:fld id="{2BF067CD-8E6B-4360-9AA8-C5DF2A48A6D1}" type="slidenum">
-              <a:rPr lang="en-US" noProof="0" smtClean="0"/>
-              <a:pPr/>
-              <a:t>2</a:t>
-            </a:fld>
-            <a:endParaRPr lang="en-US" noProof="0" dirty="0"/>
           </a:p>
         </p:txBody>
       </p:sp>
@@ -15822,6 +17633,306 @@
       </p:par>
     </p:tnLst>
   </p:timing>
+</p:sld>
+</file>
+
+<file path=ppt/slides/slide20.xml><?xml version="1.0" encoding="utf-8"?>
+<p:sld xmlns:a="http://schemas.openxmlformats.org/drawingml/2006/main" xmlns:r="http://schemas.openxmlformats.org/officeDocument/2006/relationships" xmlns:p="http://schemas.openxmlformats.org/presentationml/2006/main">
+  <p:cSld>
+    <p:spTree>
+      <p:nvGrpSpPr>
+        <p:cNvPr id="1" name=""/>
+        <p:cNvGrpSpPr/>
+        <p:nvPr/>
+      </p:nvGrpSpPr>
+      <p:grpSpPr>
+        <a:xfrm>
+          <a:off x="0" y="0"/>
+          <a:ext cx="0" cy="0"/>
+          <a:chOff x="0" y="0"/>
+          <a:chExt cx="0" cy="0"/>
+        </a:xfrm>
+      </p:grpSpPr>
+      <p:sp>
+        <p:nvSpPr>
+          <p:cNvPr id="2" name="Slide Body">
+            <a:extLst>
+              <a:ext uri="{FF2B5EF4-FFF2-40B4-BE49-F238E27FC236}">
+                <a16:creationId xmlns:a16="http://schemas.microsoft.com/office/drawing/2014/main" id="{980F49B1-E4BE-4389-A747-7AB9B71AD920}"/>
+              </a:ext>
+            </a:extLst>
+          </p:cNvPr>
+          <p:cNvSpPr>
+            <a:spLocks noGrp="1"/>
+          </p:cNvSpPr>
+          <p:nvPr>
+            <p:ph type="body" sz="quarter" idx="10"/>
+          </p:nvPr>
+        </p:nvSpPr>
+        <p:spPr>
+          <a:xfrm>
+            <a:off x="190402" y="1269001"/>
+            <a:ext cx="11818096" cy="5455890"/>
+          </a:xfrm>
+        </p:spPr>
+        <p:txBody>
+          <a:bodyPr/>
+          <a:lstStyle/>
+          <a:p>
+            <a:pPr>
+              <a:lnSpc>
+                <a:spcPct val="120000"/>
+              </a:lnSpc>
+            </a:pPr>
+            <a:r>
+              <a:rPr lang="bg-BG" dirty="0"/>
+              <a:t>Този курс</a:t>
+            </a:r>
+            <a:r>
+              <a:rPr lang="en-US" dirty="0"/>
+              <a:t> (</a:t>
+            </a:r>
+            <a:r>
+              <a:rPr lang="bg-BG" dirty="0"/>
+              <a:t>презентации, примери, демонстрационен код, упражнения, домашни, видео и други активи</a:t>
+            </a:r>
+            <a:r>
+              <a:rPr lang="en-US" dirty="0"/>
+              <a:t>) </a:t>
+            </a:r>
+            <a:r>
+              <a:rPr lang="bg-BG" dirty="0"/>
+              <a:t>представлява</a:t>
+            </a:r>
+            <a:r>
+              <a:rPr lang="en-US" dirty="0"/>
+              <a:t> </a:t>
+            </a:r>
+            <a:r>
+              <a:rPr lang="bg-BG" b="1" dirty="0"/>
+              <a:t>защитено авторско съдържание</a:t>
+            </a:r>
+            <a:endParaRPr lang="en-US" dirty="0"/>
+          </a:p>
+          <a:p>
+            <a:pPr>
+              <a:lnSpc>
+                <a:spcPct val="120000"/>
+              </a:lnSpc>
+            </a:pPr>
+            <a:r>
+              <a:rPr lang="bg-BG" dirty="0"/>
+              <a:t>Нерегламентирано копиране</a:t>
+            </a:r>
+            <a:r>
+              <a:rPr lang="en-US" dirty="0"/>
+              <a:t>,</a:t>
+            </a:r>
+            <a:r>
+              <a:rPr lang="bg-BG" dirty="0"/>
+              <a:t> разпространение или използване е незаконно</a:t>
+            </a:r>
+          </a:p>
+          <a:p>
+            <a:pPr>
+              <a:lnSpc>
+                <a:spcPct val="120000"/>
+              </a:lnSpc>
+            </a:pPr>
+            <a:r>
+              <a:rPr lang="en-US" dirty="0"/>
+              <a:t>© </a:t>
+            </a:r>
+            <a:r>
+              <a:rPr lang="bg-BG" dirty="0"/>
+              <a:t>СофтУни</a:t>
+            </a:r>
+            <a:r>
+              <a:rPr lang="en-US" dirty="0"/>
+              <a:t> – </a:t>
+            </a:r>
+            <a:r>
+              <a:rPr lang="en-US" dirty="0">
+                <a:hlinkClick r:id="rId3"/>
+              </a:rPr>
+              <a:t>https://softuni.org</a:t>
+            </a:r>
+            <a:endParaRPr lang="en-US" dirty="0"/>
+          </a:p>
+          <a:p>
+            <a:pPr>
+              <a:lnSpc>
+                <a:spcPct val="120000"/>
+              </a:lnSpc>
+            </a:pPr>
+            <a:r>
+              <a:rPr lang="en-US" dirty="0"/>
+              <a:t>© </a:t>
+            </a:r>
+            <a:r>
+              <a:rPr lang="bg-BG" dirty="0"/>
+              <a:t>Софтуерен университет</a:t>
+            </a:r>
+            <a:r>
+              <a:rPr lang="en-US" dirty="0"/>
+              <a:t> – </a:t>
+            </a:r>
+            <a:r>
+              <a:rPr lang="en-US" dirty="0">
+                <a:hlinkClick r:id="rId4"/>
+              </a:rPr>
+              <a:t>https://softuni.bg</a:t>
+            </a:r>
+            <a:endParaRPr lang="bg-BG" dirty="0"/>
+          </a:p>
+          <a:p>
+            <a:pPr>
+              <a:lnSpc>
+                <a:spcPct val="120000"/>
+              </a:lnSpc>
+            </a:pPr>
+            <a:endParaRPr lang="bg-BG" dirty="0"/>
+          </a:p>
+          <a:p>
+            <a:pPr marL="0" indent="0">
+              <a:lnSpc>
+                <a:spcPct val="120000"/>
+              </a:lnSpc>
+              <a:buNone/>
+            </a:pPr>
+            <a:endParaRPr lang="bg-BG" dirty="0"/>
+          </a:p>
+        </p:txBody>
+      </p:sp>
+      <p:pic>
+        <p:nvPicPr>
+          <p:cNvPr id="6" name="Picture License" descr="License">
+            <a:extLst>
+              <a:ext uri="{FF2B5EF4-FFF2-40B4-BE49-F238E27FC236}">
+                <a16:creationId xmlns:a16="http://schemas.microsoft.com/office/drawing/2014/main" id="{A10A2585-858C-4B1E-8846-27CF1C15729E}"/>
+              </a:ext>
+            </a:extLst>
+          </p:cNvPr>
+          <p:cNvPicPr>
+            <a:picLocks noChangeAspect="1"/>
+          </p:cNvPicPr>
+          <p:nvPr/>
+        </p:nvPicPr>
+        <p:blipFill>
+          <a:blip r:embed="rId5">
+            <a:clrChange>
+              <a:clrFrom>
+                <a:srgbClr val="FFFFFF"/>
+              </a:clrFrom>
+              <a:clrTo>
+                <a:srgbClr val="FFFFFF">
+                  <a:alpha val="0"/>
+                </a:srgbClr>
+              </a:clrTo>
+            </a:clrChange>
+          </a:blip>
+          <a:stretch>
+            <a:fillRect/>
+          </a:stretch>
+        </p:blipFill>
+        <p:spPr>
+          <a:xfrm>
+            <a:off x="9745023" y="4445455"/>
+            <a:ext cx="1930977" cy="2043545"/>
+          </a:xfrm>
+          <a:prstGeom prst="rect">
+            <a:avLst/>
+          </a:prstGeom>
+        </p:spPr>
+      </p:pic>
+      <p:sp>
+        <p:nvSpPr>
+          <p:cNvPr id="3" name="Slide Title">
+            <a:extLst>
+              <a:ext uri="{FF2B5EF4-FFF2-40B4-BE49-F238E27FC236}">
+                <a16:creationId xmlns:a16="http://schemas.microsoft.com/office/drawing/2014/main" id="{E5F1FB41-80C3-4816-BC47-CCC50632E6E8}"/>
+              </a:ext>
+            </a:extLst>
+          </p:cNvPr>
+          <p:cNvSpPr>
+            <a:spLocks noGrp="1"/>
+          </p:cNvSpPr>
+          <p:nvPr>
+            <p:ph type="title"/>
+          </p:nvPr>
+        </p:nvSpPr>
+        <p:spPr/>
+        <p:txBody>
+          <a:bodyPr/>
+          <a:lstStyle/>
+          <a:p>
+            <a:r>
+              <a:rPr lang="bg-BG" dirty="0"/>
+              <a:t>Лиценз</a:t>
+            </a:r>
+          </a:p>
+        </p:txBody>
+      </p:sp>
+      <p:sp>
+        <p:nvSpPr>
+          <p:cNvPr id="7" name="Slide Number">
+            <a:extLst>
+              <a:ext uri="{FF2B5EF4-FFF2-40B4-BE49-F238E27FC236}">
+                <a16:creationId xmlns:a16="http://schemas.microsoft.com/office/drawing/2014/main" id="{0B20C9FE-51B9-4CA1-A3B4-E16FBFC084A5}"/>
+              </a:ext>
+            </a:extLst>
+          </p:cNvPr>
+          <p:cNvSpPr>
+            <a:spLocks noGrp="1"/>
+          </p:cNvSpPr>
+          <p:nvPr>
+            <p:ph type="sldNum" sz="quarter" idx="5"/>
+          </p:nvPr>
+        </p:nvSpPr>
+        <p:spPr>
+          <a:xfrm>
+            <a:off x="11753030" y="6507000"/>
+            <a:ext cx="367414" cy="297000"/>
+          </a:xfrm>
+          <a:prstGeom prst="rect">
+            <a:avLst/>
+          </a:prstGeom>
+        </p:spPr>
+        <p:txBody>
+          <a:bodyPr vert="horz" lIns="91440" tIns="45720" rIns="91440" bIns="45720" rtlCol="0" anchor="b"/>
+          <a:lstStyle>
+            <a:lvl1pPr algn="r">
+              <a:defRPr sz="1000"/>
+            </a:lvl1pPr>
+          </a:lstStyle>
+          <a:p>
+            <a:fld id="{2BF067CD-8E6B-4360-9AA8-C5DF2A48A6D1}" type="slidenum">
+              <a:rPr lang="en-US" noProof="0" smtClean="0"/>
+              <a:pPr/>
+              <a:t>20</a:t>
+            </a:fld>
+            <a:endParaRPr lang="en-US" noProof="0" dirty="0"/>
+          </a:p>
+        </p:txBody>
+      </p:sp>
+    </p:spTree>
+    <p:extLst>
+      <p:ext uri="{BB962C8B-B14F-4D97-AF65-F5344CB8AC3E}">
+        <p14:creationId xmlns:p14="http://schemas.microsoft.com/office/powerpoint/2010/main" val="229369013"/>
+      </p:ext>
+    </p:extLst>
+  </p:cSld>
+  <p:clrMapOvr>
+    <a:masterClrMapping/>
+  </p:clrMapOvr>
+  <mc:AlternateContent xmlns:mc="http://schemas.openxmlformats.org/markup-compatibility/2006" xmlns:p14="http://schemas.microsoft.com/office/powerpoint/2010/main">
+    <mc:Choice Requires="p14">
+      <p:transition spd="slow" p14:dur="2000" advClick="0" advTm="5000"/>
+    </mc:Choice>
+    <mc:Fallback xmlns="">
+      <p:transition spd="slow" advClick="0" advTm="5000"/>
+    </mc:Fallback>
+  </mc:AlternateContent>
 </p:sld>
 </file>
 

</xml_diff>